<commit_message>
Make Crop Out Padding with grouped child items
</commit_message>
<xml_diff>
--- a/doc/test/CropLab/CropOutPadding.pptx
+++ b/doc/test/CropLab/CropOutPadding.pptx
@@ -7,7 +7,7 @@
     <p:sldMasterId id="2147483672" r:id="rId3"/>
   </p:sldMasterIdLst>
   <p:notesMasterIdLst>
-    <p:notesMasterId r:id="rId16"/>
+    <p:notesMasterId r:id="rId22"/>
   </p:notesMasterIdLst>
   <p:sldIdLst>
     <p:sldId id="287" r:id="rId4"/>
@@ -21,7 +21,13 @@
     <p:sldId id="305" r:id="rId12"/>
     <p:sldId id="306" r:id="rId13"/>
     <p:sldId id="313" r:id="rId14"/>
-    <p:sldId id="274" r:id="rId15"/>
+    <p:sldId id="317" r:id="rId15"/>
+    <p:sldId id="315" r:id="rId16"/>
+    <p:sldId id="318" r:id="rId17"/>
+    <p:sldId id="322" r:id="rId18"/>
+    <p:sldId id="320" r:id="rId19"/>
+    <p:sldId id="323" r:id="rId20"/>
+    <p:sldId id="274" r:id="rId21"/>
   </p:sldIdLst>
   <p:sldSz cx="9144000" cy="6858000" type="screen4x3"/>
   <p:notesSz cx="6858000" cy="9144000"/>
@@ -140,6 +146,12 @@
             <p14:sldId id="305"/>
             <p14:sldId id="306"/>
             <p14:sldId id="313"/>
+            <p14:sldId id="317"/>
+            <p14:sldId id="315"/>
+            <p14:sldId id="318"/>
+            <p14:sldId id="322"/>
+            <p14:sldId id="320"/>
+            <p14:sldId id="323"/>
             <p14:sldId id="274"/>
           </p14:sldIdLst>
         </p14:section>
@@ -161,6 +173,10 @@
     </p:ext>
   </p:extLst>
 </p:presentation>
+</file>
+
+<file path=ppt/revisionInfo.xml><?xml version="1.0" encoding="utf-8"?>
+<p1510:revInfo xmlns:a="http://schemas.openxmlformats.org/drawingml/2006/main" xmlns:r="http://schemas.openxmlformats.org/officeDocument/2006/relationships" xmlns:p1510="http://schemas.microsoft.com/office/powerpoint/2015/10/main"/>
 </file>
 
 <file path=ppt/notesMasters/notesMaster1.xml><?xml version="1.0" encoding="utf-8"?>
@@ -245,7 +261,7 @@
           <a:p>
             <a:fld id="{26004F41-C1A1-4B0D-9EEE-5E3F0E5BC108}" type="datetimeFigureOut">
               <a:rPr lang="en-SG" smtClean="0"/>
-              <a:t>11/5/2017</a:t>
+              <a:t>25/7/2017</a:t>
             </a:fld>
             <a:endParaRPr lang="en-SG"/>
           </a:p>
@@ -681,6 +697,174 @@
 </p:notes>
 </file>
 
+<file path=ppt/notesSlides/notesSlide3.xml><?xml version="1.0" encoding="utf-8"?>
+<p:notes xmlns:a="http://schemas.openxmlformats.org/drawingml/2006/main" xmlns:r="http://schemas.openxmlformats.org/officeDocument/2006/relationships" xmlns:p="http://schemas.openxmlformats.org/presentationml/2006/main">
+  <p:cSld>
+    <p:spTree>
+      <p:nvGrpSpPr>
+        <p:cNvPr id="1" name=""/>
+        <p:cNvGrpSpPr/>
+        <p:nvPr/>
+      </p:nvGrpSpPr>
+      <p:grpSpPr>
+        <a:xfrm>
+          <a:off x="0" y="0"/>
+          <a:ext cx="0" cy="0"/>
+          <a:chOff x="0" y="0"/>
+          <a:chExt cx="0" cy="0"/>
+        </a:xfrm>
+      </p:grpSpPr>
+      <p:sp>
+        <p:nvSpPr>
+          <p:cNvPr id="2" name="Slide Image Placeholder 1"/>
+          <p:cNvSpPr>
+            <a:spLocks noGrp="1" noRot="1" noChangeAspect="1"/>
+          </p:cNvSpPr>
+          <p:nvPr>
+            <p:ph type="sldImg"/>
+          </p:nvPr>
+        </p:nvSpPr>
+        <p:spPr/>
+      </p:sp>
+      <p:sp>
+        <p:nvSpPr>
+          <p:cNvPr id="3" name="Notes Placeholder 2"/>
+          <p:cNvSpPr>
+            <a:spLocks noGrp="1"/>
+          </p:cNvSpPr>
+          <p:nvPr>
+            <p:ph type="body" idx="1"/>
+          </p:nvPr>
+        </p:nvSpPr>
+        <p:spPr/>
+        <p:txBody>
+          <a:bodyPr/>
+          <a:lstStyle/>
+          <a:p>
+            <a:endParaRPr lang="en-SG" dirty="0"/>
+          </a:p>
+        </p:txBody>
+      </p:sp>
+      <p:sp>
+        <p:nvSpPr>
+          <p:cNvPr id="4" name="Slide Number Placeholder 3"/>
+          <p:cNvSpPr>
+            <a:spLocks noGrp="1"/>
+          </p:cNvSpPr>
+          <p:nvPr>
+            <p:ph type="sldNum" sz="quarter" idx="10"/>
+          </p:nvPr>
+        </p:nvSpPr>
+        <p:spPr/>
+        <p:txBody>
+          <a:bodyPr/>
+          <a:lstStyle/>
+          <a:p>
+            <a:fld id="{0015B511-83B7-463E-ACD1-0C1C081EBBC4}" type="slidenum">
+              <a:rPr lang="en-SG" smtClean="0"/>
+              <a:t>16</a:t>
+            </a:fld>
+            <a:endParaRPr lang="en-SG"/>
+          </a:p>
+        </p:txBody>
+      </p:sp>
+    </p:spTree>
+    <p:extLst>
+      <p:ext uri="{BB962C8B-B14F-4D97-AF65-F5344CB8AC3E}">
+        <p14:creationId xmlns:p14="http://schemas.microsoft.com/office/powerpoint/2010/main" val="1918759091"/>
+      </p:ext>
+    </p:extLst>
+  </p:cSld>
+  <p:clrMapOvr>
+    <a:masterClrMapping/>
+  </p:clrMapOvr>
+</p:notes>
+</file>
+
+<file path=ppt/notesSlides/notesSlide4.xml><?xml version="1.0" encoding="utf-8"?>
+<p:notes xmlns:a="http://schemas.openxmlformats.org/drawingml/2006/main" xmlns:r="http://schemas.openxmlformats.org/officeDocument/2006/relationships" xmlns:p="http://schemas.openxmlformats.org/presentationml/2006/main">
+  <p:cSld>
+    <p:spTree>
+      <p:nvGrpSpPr>
+        <p:cNvPr id="1" name=""/>
+        <p:cNvGrpSpPr/>
+        <p:nvPr/>
+      </p:nvGrpSpPr>
+      <p:grpSpPr>
+        <a:xfrm>
+          <a:off x="0" y="0"/>
+          <a:ext cx="0" cy="0"/>
+          <a:chOff x="0" y="0"/>
+          <a:chExt cx="0" cy="0"/>
+        </a:xfrm>
+      </p:grpSpPr>
+      <p:sp>
+        <p:nvSpPr>
+          <p:cNvPr id="2" name="Slide Image Placeholder 1"/>
+          <p:cNvSpPr>
+            <a:spLocks noGrp="1" noRot="1" noChangeAspect="1"/>
+          </p:cNvSpPr>
+          <p:nvPr>
+            <p:ph type="sldImg"/>
+          </p:nvPr>
+        </p:nvSpPr>
+        <p:spPr/>
+      </p:sp>
+      <p:sp>
+        <p:nvSpPr>
+          <p:cNvPr id="3" name="Notes Placeholder 2"/>
+          <p:cNvSpPr>
+            <a:spLocks noGrp="1"/>
+          </p:cNvSpPr>
+          <p:nvPr>
+            <p:ph type="body" idx="1"/>
+          </p:nvPr>
+        </p:nvSpPr>
+        <p:spPr/>
+        <p:txBody>
+          <a:bodyPr/>
+          <a:lstStyle/>
+          <a:p>
+            <a:endParaRPr lang="en-SG" dirty="0"/>
+          </a:p>
+        </p:txBody>
+      </p:sp>
+      <p:sp>
+        <p:nvSpPr>
+          <p:cNvPr id="4" name="Slide Number Placeholder 3"/>
+          <p:cNvSpPr>
+            <a:spLocks noGrp="1"/>
+          </p:cNvSpPr>
+          <p:nvPr>
+            <p:ph type="sldNum" sz="quarter" idx="10"/>
+          </p:nvPr>
+        </p:nvSpPr>
+        <p:spPr/>
+        <p:txBody>
+          <a:bodyPr/>
+          <a:lstStyle/>
+          <a:p>
+            <a:fld id="{0015B511-83B7-463E-ACD1-0C1C081EBBC4}" type="slidenum">
+              <a:rPr lang="en-SG" smtClean="0"/>
+              <a:t>17</a:t>
+            </a:fld>
+            <a:endParaRPr lang="en-SG"/>
+          </a:p>
+        </p:txBody>
+      </p:sp>
+    </p:spTree>
+    <p:extLst>
+      <p:ext uri="{BB962C8B-B14F-4D97-AF65-F5344CB8AC3E}">
+        <p14:creationId xmlns:p14="http://schemas.microsoft.com/office/powerpoint/2010/main" val="1765173484"/>
+      </p:ext>
+    </p:extLst>
+  </p:cSld>
+  <p:clrMapOvr>
+    <a:masterClrMapping/>
+  </p:clrMapOvr>
+</p:notes>
+</file>
+
 <file path=ppt/slideLayouts/slideLayout1.xml><?xml version="1.0" encoding="utf-8"?>
 <p:sldLayout xmlns:a="http://schemas.openxmlformats.org/drawingml/2006/main" xmlns:r="http://schemas.openxmlformats.org/officeDocument/2006/relationships" xmlns:p="http://schemas.openxmlformats.org/presentationml/2006/main" type="title" preserve="1">
   <p:cSld name="Title Slide">
@@ -860,7 +1044,7 @@
           <a:p>
             <a:fld id="{699DC775-C286-4358-8C92-D7E584E969B3}" type="datetimeFigureOut">
               <a:rPr lang="en-US" smtClean="0"/>
-              <a:t>5/11/2017</a:t>
+              <a:t>7/25/2017</a:t>
             </a:fld>
             <a:endParaRPr lang="en-US"/>
           </a:p>
@@ -1028,7 +1212,7 @@
           <a:p>
             <a:fld id="{699DC775-C286-4358-8C92-D7E584E969B3}" type="datetimeFigureOut">
               <a:rPr lang="en-US" smtClean="0"/>
-              <a:t>5/11/2017</a:t>
+              <a:t>7/25/2017</a:t>
             </a:fld>
             <a:endParaRPr lang="en-US"/>
           </a:p>
@@ -1206,7 +1390,7 @@
           <a:p>
             <a:fld id="{699DC775-C286-4358-8C92-D7E584E969B3}" type="datetimeFigureOut">
               <a:rPr lang="en-US" smtClean="0"/>
-              <a:t>5/11/2017</a:t>
+              <a:t>7/25/2017</a:t>
             </a:fld>
             <a:endParaRPr lang="en-US"/>
           </a:p>
@@ -1446,7 +1630,7 @@
           <a:p>
             <a:fld id="{699DC775-C286-4358-8C92-D7E584E969B3}" type="datetimeFigureOut">
               <a:rPr lang="en-US" smtClean="0"/>
-              <a:t>5/11/2017</a:t>
+              <a:t>7/25/2017</a:t>
             </a:fld>
             <a:endParaRPr lang="en-US"/>
           </a:p>
@@ -1614,7 +1798,7 @@
           <a:p>
             <a:fld id="{699DC775-C286-4358-8C92-D7E584E969B3}" type="datetimeFigureOut">
               <a:rPr lang="en-US" smtClean="0"/>
-              <a:t>5/11/2017</a:t>
+              <a:t>7/25/2017</a:t>
             </a:fld>
             <a:endParaRPr lang="en-US"/>
           </a:p>
@@ -1859,7 +2043,7 @@
           <a:p>
             <a:fld id="{699DC775-C286-4358-8C92-D7E584E969B3}" type="datetimeFigureOut">
               <a:rPr lang="en-US" smtClean="0"/>
-              <a:t>5/11/2017</a:t>
+              <a:t>7/25/2017</a:t>
             </a:fld>
             <a:endParaRPr lang="en-US"/>
           </a:p>
@@ -2144,7 +2328,7 @@
           <a:p>
             <a:fld id="{699DC775-C286-4358-8C92-D7E584E969B3}" type="datetimeFigureOut">
               <a:rPr lang="en-US" smtClean="0"/>
-              <a:t>5/11/2017</a:t>
+              <a:t>7/25/2017</a:t>
             </a:fld>
             <a:endParaRPr lang="en-US"/>
           </a:p>
@@ -2563,7 +2747,7 @@
           <a:p>
             <a:fld id="{699DC775-C286-4358-8C92-D7E584E969B3}" type="datetimeFigureOut">
               <a:rPr lang="en-US" smtClean="0"/>
-              <a:t>5/11/2017</a:t>
+              <a:t>7/25/2017</a:t>
             </a:fld>
             <a:endParaRPr lang="en-US"/>
           </a:p>
@@ -2680,7 +2864,7 @@
           <a:p>
             <a:fld id="{699DC775-C286-4358-8C92-D7E584E969B3}" type="datetimeFigureOut">
               <a:rPr lang="en-US" smtClean="0"/>
-              <a:t>5/11/2017</a:t>
+              <a:t>7/25/2017</a:t>
             </a:fld>
             <a:endParaRPr lang="en-US"/>
           </a:p>
@@ -2775,7 +2959,7 @@
           <a:p>
             <a:fld id="{699DC775-C286-4358-8C92-D7E584E969B3}" type="datetimeFigureOut">
               <a:rPr lang="en-US" smtClean="0"/>
-              <a:t>5/11/2017</a:t>
+              <a:t>7/25/2017</a:t>
             </a:fld>
             <a:endParaRPr lang="en-US"/>
           </a:p>
@@ -3050,7 +3234,7 @@
           <a:p>
             <a:fld id="{699DC775-C286-4358-8C92-D7E584E969B3}" type="datetimeFigureOut">
               <a:rPr lang="en-US" smtClean="0"/>
-              <a:t>5/11/2017</a:t>
+              <a:t>7/25/2017</a:t>
             </a:fld>
             <a:endParaRPr lang="en-US"/>
           </a:p>
@@ -3218,7 +3402,7 @@
           <a:p>
             <a:fld id="{699DC775-C286-4358-8C92-D7E584E969B3}" type="datetimeFigureOut">
               <a:rPr lang="en-US" smtClean="0"/>
-              <a:t>5/11/2017</a:t>
+              <a:t>7/25/2017</a:t>
             </a:fld>
             <a:endParaRPr lang="en-US"/>
           </a:p>
@@ -3470,7 +3654,7 @@
           <a:p>
             <a:fld id="{699DC775-C286-4358-8C92-D7E584E969B3}" type="datetimeFigureOut">
               <a:rPr lang="en-US" smtClean="0"/>
-              <a:t>5/11/2017</a:t>
+              <a:t>7/25/2017</a:t>
             </a:fld>
             <a:endParaRPr lang="en-US"/>
           </a:p>
@@ -3638,7 +3822,7 @@
           <a:p>
             <a:fld id="{699DC775-C286-4358-8C92-D7E584E969B3}" type="datetimeFigureOut">
               <a:rPr lang="en-US" smtClean="0"/>
-              <a:t>5/11/2017</a:t>
+              <a:t>7/25/2017</a:t>
             </a:fld>
             <a:endParaRPr lang="en-US"/>
           </a:p>
@@ -3816,7 +4000,7 @@
           <a:p>
             <a:fld id="{699DC775-C286-4358-8C92-D7E584E969B3}" type="datetimeFigureOut">
               <a:rPr lang="en-US" smtClean="0"/>
-              <a:t>5/11/2017</a:t>
+              <a:t>7/25/2017</a:t>
             </a:fld>
             <a:endParaRPr lang="en-US"/>
           </a:p>
@@ -4064,7 +4248,7 @@
           <a:p>
             <a:fld id="{699DC775-C286-4358-8C92-D7E584E969B3}" type="datetimeFigureOut">
               <a:rPr lang="en-US" smtClean="0"/>
-              <a:t>5/11/2017</a:t>
+              <a:t>7/25/2017</a:t>
             </a:fld>
             <a:endParaRPr lang="en-US"/>
           </a:p>
@@ -4240,7 +4424,7 @@
           <a:p>
             <a:fld id="{699DC775-C286-4358-8C92-D7E584E969B3}" type="datetimeFigureOut">
               <a:rPr lang="en-US" smtClean="0"/>
-              <a:t>5/11/2017</a:t>
+              <a:t>7/25/2017</a:t>
             </a:fld>
             <a:endParaRPr lang="en-US"/>
           </a:p>
@@ -4493,7 +4677,7 @@
           <a:p>
             <a:fld id="{699DC775-C286-4358-8C92-D7E584E969B3}" type="datetimeFigureOut">
               <a:rPr lang="en-US" smtClean="0"/>
-              <a:t>5/11/2017</a:t>
+              <a:t>7/25/2017</a:t>
             </a:fld>
             <a:endParaRPr lang="en-US"/>
           </a:p>
@@ -4786,7 +4970,7 @@
           <a:p>
             <a:fld id="{699DC775-C286-4358-8C92-D7E584E969B3}" type="datetimeFigureOut">
               <a:rPr lang="en-US" smtClean="0"/>
-              <a:t>5/11/2017</a:t>
+              <a:t>7/25/2017</a:t>
             </a:fld>
             <a:endParaRPr lang="en-US"/>
           </a:p>
@@ -5213,7 +5397,7 @@
           <a:p>
             <a:fld id="{699DC775-C286-4358-8C92-D7E584E969B3}" type="datetimeFigureOut">
               <a:rPr lang="en-US" smtClean="0"/>
-              <a:t>5/11/2017</a:t>
+              <a:t>7/25/2017</a:t>
             </a:fld>
             <a:endParaRPr lang="en-US"/>
           </a:p>
@@ -5338,7 +5522,7 @@
           <a:p>
             <a:fld id="{699DC775-C286-4358-8C92-D7E584E969B3}" type="datetimeFigureOut">
               <a:rPr lang="en-US" smtClean="0"/>
-              <a:t>5/11/2017</a:t>
+              <a:t>7/25/2017</a:t>
             </a:fld>
             <a:endParaRPr lang="en-US"/>
           </a:p>
@@ -5441,7 +5625,7 @@
           <a:p>
             <a:fld id="{699DC775-C286-4358-8C92-D7E584E969B3}" type="datetimeFigureOut">
               <a:rPr lang="en-US" smtClean="0"/>
-              <a:t>5/11/2017</a:t>
+              <a:t>7/25/2017</a:t>
             </a:fld>
             <a:endParaRPr lang="en-US"/>
           </a:p>
@@ -5686,7 +5870,7 @@
           <a:p>
             <a:fld id="{699DC775-C286-4358-8C92-D7E584E969B3}" type="datetimeFigureOut">
               <a:rPr lang="en-US" smtClean="0"/>
-              <a:t>5/11/2017</a:t>
+              <a:t>7/25/2017</a:t>
             </a:fld>
             <a:endParaRPr lang="en-US"/>
           </a:p>
@@ -5969,7 +6153,7 @@
           <a:p>
             <a:fld id="{699DC775-C286-4358-8C92-D7E584E969B3}" type="datetimeFigureOut">
               <a:rPr lang="en-US" smtClean="0"/>
-              <a:t>5/11/2017</a:t>
+              <a:t>7/25/2017</a:t>
             </a:fld>
             <a:endParaRPr lang="en-US"/>
           </a:p>
@@ -6229,7 +6413,7 @@
           <a:p>
             <a:fld id="{699DC775-C286-4358-8C92-D7E584E969B3}" type="datetimeFigureOut">
               <a:rPr lang="en-US" smtClean="0"/>
-              <a:t>5/11/2017</a:t>
+              <a:t>7/25/2017</a:t>
             </a:fld>
             <a:endParaRPr lang="en-US"/>
           </a:p>
@@ -6405,7 +6589,7 @@
           <a:p>
             <a:fld id="{699DC775-C286-4358-8C92-D7E584E969B3}" type="datetimeFigureOut">
               <a:rPr lang="en-US" smtClean="0"/>
-              <a:t>5/11/2017</a:t>
+              <a:t>7/25/2017</a:t>
             </a:fld>
             <a:endParaRPr lang="en-US"/>
           </a:p>
@@ -6591,7 +6775,7 @@
           <a:p>
             <a:fld id="{699DC775-C286-4358-8C92-D7E584E969B3}" type="datetimeFigureOut">
               <a:rPr lang="en-US" smtClean="0"/>
-              <a:t>5/11/2017</a:t>
+              <a:t>7/25/2017</a:t>
             </a:fld>
             <a:endParaRPr lang="en-US"/>
           </a:p>
@@ -6876,7 +7060,7 @@
           <a:p>
             <a:fld id="{699DC775-C286-4358-8C92-D7E584E969B3}" type="datetimeFigureOut">
               <a:rPr lang="en-US" smtClean="0"/>
-              <a:t>5/11/2017</a:t>
+              <a:t>7/25/2017</a:t>
             </a:fld>
             <a:endParaRPr lang="en-US"/>
           </a:p>
@@ -7295,7 +7479,7 @@
           <a:p>
             <a:fld id="{699DC775-C286-4358-8C92-D7E584E969B3}" type="datetimeFigureOut">
               <a:rPr lang="en-US" smtClean="0"/>
-              <a:t>5/11/2017</a:t>
+              <a:t>7/25/2017</a:t>
             </a:fld>
             <a:endParaRPr lang="en-US"/>
           </a:p>
@@ -7412,7 +7596,7 @@
           <a:p>
             <a:fld id="{699DC775-C286-4358-8C92-D7E584E969B3}" type="datetimeFigureOut">
               <a:rPr lang="en-US" smtClean="0"/>
-              <a:t>5/11/2017</a:t>
+              <a:t>7/25/2017</a:t>
             </a:fld>
             <a:endParaRPr lang="en-US"/>
           </a:p>
@@ -7507,7 +7691,7 @@
           <a:p>
             <a:fld id="{699DC775-C286-4358-8C92-D7E584E969B3}" type="datetimeFigureOut">
               <a:rPr lang="en-US" smtClean="0"/>
-              <a:t>5/11/2017</a:t>
+              <a:t>7/25/2017</a:t>
             </a:fld>
             <a:endParaRPr lang="en-US"/>
           </a:p>
@@ -7782,7 +7966,7 @@
           <a:p>
             <a:fld id="{699DC775-C286-4358-8C92-D7E584E969B3}" type="datetimeFigureOut">
               <a:rPr lang="en-US" smtClean="0"/>
-              <a:t>5/11/2017</a:t>
+              <a:t>7/25/2017</a:t>
             </a:fld>
             <a:endParaRPr lang="en-US"/>
           </a:p>
@@ -8034,7 +8218,7 @@
           <a:p>
             <a:fld id="{699DC775-C286-4358-8C92-D7E584E969B3}" type="datetimeFigureOut">
               <a:rPr lang="en-US" smtClean="0"/>
-              <a:t>5/11/2017</a:t>
+              <a:t>7/25/2017</a:t>
             </a:fld>
             <a:endParaRPr lang="en-US"/>
           </a:p>
@@ -8245,7 +8429,7 @@
           <a:p>
             <a:fld id="{699DC775-C286-4358-8C92-D7E584E969B3}" type="datetimeFigureOut">
               <a:rPr lang="en-US" smtClean="0"/>
-              <a:t>5/11/2017</a:t>
+              <a:t>7/25/2017</a:t>
             </a:fld>
             <a:endParaRPr lang="en-US"/>
           </a:p>
@@ -8758,7 +8942,7 @@
           <a:p>
             <a:fld id="{699DC775-C286-4358-8C92-D7E584E969B3}" type="datetimeFigureOut">
               <a:rPr lang="en-US" smtClean="0"/>
-              <a:t>5/11/2017</a:t>
+              <a:t>7/25/2017</a:t>
             </a:fld>
             <a:endParaRPr lang="en-US"/>
           </a:p>
@@ -9269,7 +9453,7 @@
           <a:p>
             <a:fld id="{699DC775-C286-4358-8C92-D7E584E969B3}" type="datetimeFigureOut">
               <a:rPr lang="en-US" smtClean="0"/>
-              <a:t>5/11/2017</a:t>
+              <a:t>7/25/2017</a:t>
             </a:fld>
             <a:endParaRPr lang="en-US"/>
           </a:p>
@@ -9931,6 +10115,809 @@
 </file>
 
 <file path=ppt/slides/slide12.xml><?xml version="1.0" encoding="utf-8"?>
+<p:sld xmlns:a="http://schemas.openxmlformats.org/drawingml/2006/main" xmlns:r="http://schemas.openxmlformats.org/officeDocument/2006/relationships" xmlns:p="http://schemas.openxmlformats.org/presentationml/2006/main">
+  <p:cSld>
+    <p:spTree>
+      <p:nvGrpSpPr>
+        <p:cNvPr id="1" name=""/>
+        <p:cNvGrpSpPr/>
+        <p:nvPr/>
+      </p:nvGrpSpPr>
+      <p:grpSpPr>
+        <a:xfrm>
+          <a:off x="0" y="0"/>
+          <a:ext cx="0" cy="0"/>
+          <a:chOff x="0" y="0"/>
+          <a:chExt cx="0" cy="0"/>
+        </a:xfrm>
+      </p:grpSpPr>
+      <p:sp>
+        <p:nvSpPr>
+          <p:cNvPr id="2" name="Title 1"/>
+          <p:cNvSpPr>
+            <a:spLocks noGrp="1"/>
+          </p:cNvSpPr>
+          <p:nvPr>
+            <p:ph type="title"/>
+          </p:nvPr>
+        </p:nvSpPr>
+        <p:spPr/>
+        <p:txBody>
+          <a:bodyPr/>
+          <a:lstStyle/>
+          <a:p>
+            <a:r>
+              <a:rPr lang="en-US" dirty="0"/>
+              <a:t>Crop Out Padding:: one child picture</a:t>
+            </a:r>
+            <a:endParaRPr lang="en-SG" dirty="0"/>
+          </a:p>
+        </p:txBody>
+      </p:sp>
+      <p:sp>
+        <p:nvSpPr>
+          <p:cNvPr id="3" name="Content Placeholder 2"/>
+          <p:cNvSpPr>
+            <a:spLocks noGrp="1"/>
+          </p:cNvSpPr>
+          <p:nvPr>
+            <p:ph idx="1"/>
+          </p:nvPr>
+        </p:nvSpPr>
+        <p:spPr/>
+        <p:txBody>
+          <a:bodyPr/>
+          <a:lstStyle/>
+          <a:p>
+            <a:endParaRPr lang="en-SG" dirty="0"/>
+          </a:p>
+        </p:txBody>
+      </p:sp>
+    </p:spTree>
+    <p:extLst>
+      <p:ext uri="{BB962C8B-B14F-4D97-AF65-F5344CB8AC3E}">
+        <p14:creationId xmlns:p14="http://schemas.microsoft.com/office/powerpoint/2010/main" val="473049858"/>
+      </p:ext>
+    </p:extLst>
+  </p:cSld>
+  <p:clrMapOvr>
+    <a:masterClrMapping/>
+  </p:clrMapOvr>
+</p:sld>
+</file>
+
+<file path=ppt/slides/slide13.xml><?xml version="1.0" encoding="utf-8"?>
+<p:sld xmlns:a="http://schemas.openxmlformats.org/drawingml/2006/main" xmlns:r="http://schemas.openxmlformats.org/officeDocument/2006/relationships" xmlns:p="http://schemas.openxmlformats.org/presentationml/2006/main">
+  <p:cSld>
+    <p:spTree>
+      <p:nvGrpSpPr>
+        <p:cNvPr id="1" name=""/>
+        <p:cNvGrpSpPr/>
+        <p:nvPr/>
+      </p:nvGrpSpPr>
+      <p:grpSpPr>
+        <a:xfrm>
+          <a:off x="0" y="0"/>
+          <a:ext cx="0" cy="0"/>
+          <a:chOff x="0" y="0"/>
+          <a:chExt cx="0" cy="0"/>
+        </a:xfrm>
+      </p:grpSpPr>
+      <p:grpSp>
+        <p:nvGrpSpPr>
+          <p:cNvPr id="3" name="Group 2">
+            <a:extLst>
+              <a:ext uri="{FF2B5EF4-FFF2-40B4-BE49-F238E27FC236}">
+                <a16:creationId xmlns:a16="http://schemas.microsoft.com/office/drawing/2014/main" id="{211E2D37-7C31-454B-8116-6DAC0F76564F}"/>
+              </a:ext>
+            </a:extLst>
+          </p:cNvPr>
+          <p:cNvGrpSpPr/>
+          <p:nvPr/>
+        </p:nvGrpSpPr>
+        <p:grpSpPr>
+          <a:xfrm>
+            <a:off x="381000" y="254397"/>
+            <a:ext cx="7365603" cy="6349206"/>
+            <a:chOff x="381000" y="254397"/>
+            <a:chExt cx="7365603" cy="6349206"/>
+          </a:xfrm>
+        </p:grpSpPr>
+        <p:pic>
+          <p:nvPicPr>
+            <p:cNvPr id="5" name="selectMe"/>
+            <p:cNvPicPr>
+              <a:picLocks noChangeAspect="1"/>
+            </p:cNvPicPr>
+            <p:nvPr/>
+          </p:nvPicPr>
+          <p:blipFill>
+            <a:blip r:embed="rId2">
+              <a:extLst>
+                <a:ext uri="{28A0092B-C50C-407E-A947-70E740481C1C}">
+                  <a14:useLocalDpi xmlns:a14="http://schemas.microsoft.com/office/drawing/2010/main" val="0"/>
+                </a:ext>
+              </a:extLst>
+            </a:blip>
+            <a:stretch>
+              <a:fillRect/>
+            </a:stretch>
+          </p:blipFill>
+          <p:spPr>
+            <a:xfrm>
+              <a:off x="1397397" y="254397"/>
+              <a:ext cx="6349206" cy="6349206"/>
+            </a:xfrm>
+            <a:prstGeom prst="rect">
+              <a:avLst/>
+            </a:prstGeom>
+          </p:spPr>
+        </p:pic>
+        <p:sp>
+          <p:nvSpPr>
+            <p:cNvPr id="2" name="Rectangle 1">
+              <a:extLst>
+                <a:ext uri="{FF2B5EF4-FFF2-40B4-BE49-F238E27FC236}">
+                  <a16:creationId xmlns:a16="http://schemas.microsoft.com/office/drawing/2014/main" id="{8E1B5EBF-E7E6-4AFA-85D0-1E02081FD3C6}"/>
+                </a:ext>
+              </a:extLst>
+            </p:cNvPr>
+            <p:cNvSpPr/>
+            <p:nvPr/>
+          </p:nvSpPr>
+          <p:spPr>
+            <a:xfrm>
+              <a:off x="381000" y="2590800"/>
+              <a:ext cx="3048000" cy="1676400"/>
+            </a:xfrm>
+            <a:prstGeom prst="rect">
+              <a:avLst/>
+            </a:prstGeom>
+          </p:spPr>
+          <p:style>
+            <a:lnRef idx="2">
+              <a:schemeClr val="accent1">
+                <a:shade val="50000"/>
+              </a:schemeClr>
+            </a:lnRef>
+            <a:fillRef idx="1">
+              <a:schemeClr val="accent1"/>
+            </a:fillRef>
+            <a:effectRef idx="0">
+              <a:schemeClr val="accent1"/>
+            </a:effectRef>
+            <a:fontRef idx="minor">
+              <a:schemeClr val="lt1"/>
+            </a:fontRef>
+          </p:style>
+          <p:txBody>
+            <a:bodyPr rtlCol="0" anchor="ctr"/>
+            <a:lstStyle/>
+            <a:p>
+              <a:pPr algn="ctr"/>
+              <a:endParaRPr lang="en-US"/>
+            </a:p>
+          </p:txBody>
+        </p:sp>
+      </p:grpSp>
+    </p:spTree>
+    <p:extLst>
+      <p:ext uri="{BB962C8B-B14F-4D97-AF65-F5344CB8AC3E}">
+        <p14:creationId xmlns:p14="http://schemas.microsoft.com/office/powerpoint/2010/main" val="1977358948"/>
+      </p:ext>
+    </p:extLst>
+  </p:cSld>
+  <p:clrMapOvr>
+    <a:masterClrMapping/>
+  </p:clrMapOvr>
+</p:sld>
+</file>
+
+<file path=ppt/slides/slide14.xml><?xml version="1.0" encoding="utf-8"?>
+<p:sld xmlns:a="http://schemas.openxmlformats.org/drawingml/2006/main" xmlns:r="http://schemas.openxmlformats.org/officeDocument/2006/relationships" xmlns:p="http://schemas.openxmlformats.org/presentationml/2006/main">
+  <p:cSld>
+    <p:spTree>
+      <p:nvGrpSpPr>
+        <p:cNvPr id="1" name=""/>
+        <p:cNvGrpSpPr/>
+        <p:nvPr/>
+      </p:nvGrpSpPr>
+      <p:grpSpPr>
+        <a:xfrm>
+          <a:off x="0" y="0"/>
+          <a:ext cx="0" cy="0"/>
+          <a:chOff x="0" y="0"/>
+          <a:chExt cx="0" cy="0"/>
+        </a:xfrm>
+      </p:grpSpPr>
+      <p:grpSp>
+        <p:nvGrpSpPr>
+          <p:cNvPr id="3" name="Group 2">
+            <a:extLst>
+              <a:ext uri="{FF2B5EF4-FFF2-40B4-BE49-F238E27FC236}">
+                <a16:creationId xmlns:a16="http://schemas.microsoft.com/office/drawing/2014/main" id="{211E2D37-7C31-454B-8116-6DAC0F76564F}"/>
+              </a:ext>
+            </a:extLst>
+          </p:cNvPr>
+          <p:cNvGrpSpPr/>
+          <p:nvPr/>
+        </p:nvGrpSpPr>
+        <p:grpSpPr>
+          <a:xfrm>
+            <a:off x="381000" y="1951331"/>
+            <a:ext cx="5611462" cy="2955332"/>
+            <a:chOff x="381000" y="1951331"/>
+            <a:chExt cx="5611462" cy="2955332"/>
+          </a:xfrm>
+        </p:grpSpPr>
+        <p:pic>
+          <p:nvPicPr>
+            <p:cNvPr id="5" name="selectMe"/>
+            <p:cNvPicPr>
+              <a:picLocks noChangeAspect="1"/>
+            </p:cNvPicPr>
+            <p:nvPr/>
+          </p:nvPicPr>
+          <p:blipFill>
+            <a:blip r:embed="rId2">
+              <a:extLst>
+                <a:ext uri="{28A0092B-C50C-407E-A947-70E740481C1C}">
+                  <a14:useLocalDpi xmlns:a14="http://schemas.microsoft.com/office/drawing/2010/main" val="0"/>
+                </a:ext>
+              </a:extLst>
+            </a:blip>
+            <a:srcRect l="26727" t="26727" r="27628" b="26727"/>
+            <a:stretch>
+              <a:fillRect/>
+            </a:stretch>
+          </p:blipFill>
+          <p:spPr>
+            <a:xfrm>
+              <a:off x="3094331" y="1951331"/>
+              <a:ext cx="2898131" cy="2955332"/>
+            </a:xfrm>
+            <a:prstGeom prst="rect">
+              <a:avLst/>
+            </a:prstGeom>
+          </p:spPr>
+        </p:pic>
+        <p:sp>
+          <p:nvSpPr>
+            <p:cNvPr id="2" name="Rectangle 1">
+              <a:extLst>
+                <a:ext uri="{FF2B5EF4-FFF2-40B4-BE49-F238E27FC236}">
+                  <a16:creationId xmlns:a16="http://schemas.microsoft.com/office/drawing/2014/main" id="{8E1B5EBF-E7E6-4AFA-85D0-1E02081FD3C6}"/>
+                </a:ext>
+              </a:extLst>
+            </p:cNvPr>
+            <p:cNvSpPr/>
+            <p:nvPr/>
+          </p:nvSpPr>
+          <p:spPr>
+            <a:xfrm>
+              <a:off x="381000" y="2590800"/>
+              <a:ext cx="3048000" cy="1676400"/>
+            </a:xfrm>
+            <a:prstGeom prst="rect">
+              <a:avLst/>
+            </a:prstGeom>
+          </p:spPr>
+          <p:style>
+            <a:lnRef idx="2">
+              <a:schemeClr val="accent1">
+                <a:shade val="50000"/>
+              </a:schemeClr>
+            </a:lnRef>
+            <a:fillRef idx="1">
+              <a:schemeClr val="accent1"/>
+            </a:fillRef>
+            <a:effectRef idx="0">
+              <a:schemeClr val="accent1"/>
+            </a:effectRef>
+            <a:fontRef idx="minor">
+              <a:schemeClr val="lt1"/>
+            </a:fontRef>
+          </p:style>
+          <p:txBody>
+            <a:bodyPr rtlCol="0" anchor="ctr"/>
+            <a:lstStyle/>
+            <a:p>
+              <a:pPr algn="ctr"/>
+              <a:endParaRPr lang="en-US"/>
+            </a:p>
+          </p:txBody>
+        </p:sp>
+      </p:grpSp>
+      <p:sp>
+        <p:nvSpPr>
+          <p:cNvPr id="6" name="text 3">
+            <a:extLst>
+              <a:ext uri="{FF2B5EF4-FFF2-40B4-BE49-F238E27FC236}">
+                <a16:creationId xmlns:a16="http://schemas.microsoft.com/office/drawing/2014/main" id="{D7878B1D-5ACA-488E-B4AA-41FF2D9C8795}"/>
+              </a:ext>
+            </a:extLst>
+          </p:cNvPr>
+          <p:cNvSpPr txBox="1"/>
+          <p:nvPr/>
+        </p:nvSpPr>
+        <p:spPr>
+          <a:xfrm>
+            <a:off x="3365631" y="6019800"/>
+            <a:ext cx="2693814" cy="523220"/>
+          </a:xfrm>
+          <a:prstGeom prst="rect">
+            <a:avLst/>
+          </a:prstGeom>
+          <a:noFill/>
+        </p:spPr>
+        <p:txBody>
+          <a:bodyPr wrap="none" rtlCol="0">
+            <a:spAutoFit/>
+          </a:bodyPr>
+          <a:lstStyle/>
+          <a:p>
+            <a:r>
+              <a:rPr lang="en-US" sz="2800" b="1" dirty="0">
+                <a:solidFill>
+                  <a:schemeClr val="accent1"/>
+                </a:solidFill>
+              </a:rPr>
+              <a:t>Expected Output</a:t>
+            </a:r>
+            <a:endParaRPr lang="en-SG" sz="2800" b="1" dirty="0">
+              <a:solidFill>
+                <a:schemeClr val="accent1"/>
+              </a:solidFill>
+            </a:endParaRPr>
+          </a:p>
+        </p:txBody>
+      </p:sp>
+    </p:spTree>
+    <p:extLst>
+      <p:ext uri="{BB962C8B-B14F-4D97-AF65-F5344CB8AC3E}">
+        <p14:creationId xmlns:p14="http://schemas.microsoft.com/office/powerpoint/2010/main" val="728863948"/>
+      </p:ext>
+    </p:extLst>
+  </p:cSld>
+  <p:clrMapOvr>
+    <a:masterClrMapping/>
+  </p:clrMapOvr>
+</p:sld>
+</file>
+
+<file path=ppt/slides/slide15.xml><?xml version="1.0" encoding="utf-8"?>
+<p:sld xmlns:a="http://schemas.openxmlformats.org/drawingml/2006/main" xmlns:r="http://schemas.openxmlformats.org/officeDocument/2006/relationships" xmlns:p="http://schemas.openxmlformats.org/presentationml/2006/main">
+  <p:cSld>
+    <p:spTree>
+      <p:nvGrpSpPr>
+        <p:cNvPr id="1" name=""/>
+        <p:cNvGrpSpPr/>
+        <p:nvPr/>
+      </p:nvGrpSpPr>
+      <p:grpSpPr>
+        <a:xfrm>
+          <a:off x="0" y="0"/>
+          <a:ext cx="0" cy="0"/>
+          <a:chOff x="0" y="0"/>
+          <a:chExt cx="0" cy="0"/>
+        </a:xfrm>
+      </p:grpSpPr>
+      <p:sp>
+        <p:nvSpPr>
+          <p:cNvPr id="2" name="Title 1"/>
+          <p:cNvSpPr>
+            <a:spLocks noGrp="1"/>
+          </p:cNvSpPr>
+          <p:nvPr>
+            <p:ph type="title"/>
+          </p:nvPr>
+        </p:nvSpPr>
+        <p:spPr/>
+        <p:txBody>
+          <a:bodyPr/>
+          <a:lstStyle/>
+          <a:p>
+            <a:r>
+              <a:rPr lang="en-US" dirty="0"/>
+              <a:t>Crop Out Padding:: multiple child pictures</a:t>
+            </a:r>
+            <a:endParaRPr lang="en-SG" dirty="0"/>
+          </a:p>
+        </p:txBody>
+      </p:sp>
+      <p:sp>
+        <p:nvSpPr>
+          <p:cNvPr id="3" name="Content Placeholder 2"/>
+          <p:cNvSpPr>
+            <a:spLocks noGrp="1"/>
+          </p:cNvSpPr>
+          <p:nvPr>
+            <p:ph idx="1"/>
+          </p:nvPr>
+        </p:nvSpPr>
+        <p:spPr/>
+        <p:txBody>
+          <a:bodyPr/>
+          <a:lstStyle/>
+          <a:p>
+            <a:endParaRPr lang="en-SG" dirty="0"/>
+          </a:p>
+        </p:txBody>
+      </p:sp>
+    </p:spTree>
+    <p:extLst>
+      <p:ext uri="{BB962C8B-B14F-4D97-AF65-F5344CB8AC3E}">
+        <p14:creationId xmlns:p14="http://schemas.microsoft.com/office/powerpoint/2010/main" val="1911882694"/>
+      </p:ext>
+    </p:extLst>
+  </p:cSld>
+  <p:clrMapOvr>
+    <a:masterClrMapping/>
+  </p:clrMapOvr>
+</p:sld>
+</file>
+
+<file path=ppt/slides/slide16.xml><?xml version="1.0" encoding="utf-8"?>
+<p:sld xmlns:a="http://schemas.openxmlformats.org/drawingml/2006/main" xmlns:r="http://schemas.openxmlformats.org/officeDocument/2006/relationships" xmlns:p="http://schemas.openxmlformats.org/presentationml/2006/main">
+  <p:cSld>
+    <p:spTree>
+      <p:nvGrpSpPr>
+        <p:cNvPr id="1" name=""/>
+        <p:cNvGrpSpPr/>
+        <p:nvPr/>
+      </p:nvGrpSpPr>
+      <p:grpSpPr>
+        <a:xfrm>
+          <a:off x="0" y="0"/>
+          <a:ext cx="0" cy="0"/>
+          <a:chOff x="0" y="0"/>
+          <a:chExt cx="0" cy="0"/>
+        </a:xfrm>
+      </p:grpSpPr>
+      <p:grpSp>
+        <p:nvGrpSpPr>
+          <p:cNvPr id="2" name="Group 1">
+            <a:extLst>
+              <a:ext uri="{FF2B5EF4-FFF2-40B4-BE49-F238E27FC236}">
+                <a16:creationId xmlns:a16="http://schemas.microsoft.com/office/drawing/2014/main" id="{4498AAC2-84A1-410F-B0B6-2A4FD98A0570}"/>
+              </a:ext>
+            </a:extLst>
+          </p:cNvPr>
+          <p:cNvGrpSpPr/>
+          <p:nvPr/>
+        </p:nvGrpSpPr>
+        <p:grpSpPr>
+          <a:xfrm>
+            <a:off x="-304800" y="304800"/>
+            <a:ext cx="10006806" cy="6365708"/>
+            <a:chOff x="-304800" y="304800"/>
+            <a:chExt cx="10006806" cy="6365708"/>
+          </a:xfrm>
+        </p:grpSpPr>
+        <p:pic>
+          <p:nvPicPr>
+            <p:cNvPr id="13" name="selectMe2"/>
+            <p:cNvPicPr>
+              <a:picLocks noChangeAspect="1"/>
+            </p:cNvPicPr>
+            <p:nvPr/>
+          </p:nvPicPr>
+          <p:blipFill>
+            <a:blip r:embed="rId3">
+              <a:extLst>
+                <a:ext uri="{28A0092B-C50C-407E-A947-70E740481C1C}">
+                  <a14:useLocalDpi xmlns:a14="http://schemas.microsoft.com/office/drawing/2010/main" val="0"/>
+                </a:ext>
+              </a:extLst>
+            </a:blip>
+            <a:stretch>
+              <a:fillRect/>
+            </a:stretch>
+          </p:blipFill>
+          <p:spPr>
+            <a:xfrm>
+              <a:off x="-304800" y="321302"/>
+              <a:ext cx="6349206" cy="6349206"/>
+            </a:xfrm>
+            <a:prstGeom prst="rect">
+              <a:avLst/>
+            </a:prstGeom>
+          </p:spPr>
+        </p:pic>
+        <p:pic>
+          <p:nvPicPr>
+            <p:cNvPr id="14" name="selectMe1"/>
+            <p:cNvPicPr>
+              <a:picLocks noChangeAspect="1"/>
+            </p:cNvPicPr>
+            <p:nvPr/>
+          </p:nvPicPr>
+          <p:blipFill>
+            <a:blip r:embed="rId3">
+              <a:extLst>
+                <a:ext uri="{28A0092B-C50C-407E-A947-70E740481C1C}">
+                  <a14:useLocalDpi xmlns:a14="http://schemas.microsoft.com/office/drawing/2010/main" val="0"/>
+                </a:ext>
+              </a:extLst>
+            </a:blip>
+            <a:stretch>
+              <a:fillRect/>
+            </a:stretch>
+          </p:blipFill>
+          <p:spPr>
+            <a:xfrm>
+              <a:off x="3352800" y="304800"/>
+              <a:ext cx="6349206" cy="6349206"/>
+            </a:xfrm>
+            <a:prstGeom prst="rect">
+              <a:avLst/>
+            </a:prstGeom>
+          </p:spPr>
+        </p:pic>
+        <p:sp>
+          <p:nvSpPr>
+            <p:cNvPr id="4" name="Rectangle 3">
+              <a:extLst>
+                <a:ext uri="{FF2B5EF4-FFF2-40B4-BE49-F238E27FC236}">
+                  <a16:creationId xmlns:a16="http://schemas.microsoft.com/office/drawing/2014/main" id="{AAC13E55-CEB0-45AB-90EC-EC5BB05F6DE5}"/>
+                </a:ext>
+              </a:extLst>
+            </p:cNvPr>
+            <p:cNvSpPr/>
+            <p:nvPr/>
+          </p:nvSpPr>
+          <p:spPr>
+            <a:xfrm>
+              <a:off x="381000" y="2590800"/>
+              <a:ext cx="3048000" cy="1676400"/>
+            </a:xfrm>
+            <a:prstGeom prst="rect">
+              <a:avLst/>
+            </a:prstGeom>
+          </p:spPr>
+          <p:style>
+            <a:lnRef idx="2">
+              <a:schemeClr val="accent1">
+                <a:shade val="50000"/>
+              </a:schemeClr>
+            </a:lnRef>
+            <a:fillRef idx="1">
+              <a:schemeClr val="accent1"/>
+            </a:fillRef>
+            <a:effectRef idx="0">
+              <a:schemeClr val="accent1"/>
+            </a:effectRef>
+            <a:fontRef idx="minor">
+              <a:schemeClr val="lt1"/>
+            </a:fontRef>
+          </p:style>
+          <p:txBody>
+            <a:bodyPr rtlCol="0" anchor="ctr"/>
+            <a:lstStyle/>
+            <a:p>
+              <a:pPr algn="ctr"/>
+              <a:endParaRPr lang="en-US"/>
+            </a:p>
+          </p:txBody>
+        </p:sp>
+      </p:grpSp>
+    </p:spTree>
+    <p:extLst>
+      <p:ext uri="{BB962C8B-B14F-4D97-AF65-F5344CB8AC3E}">
+        <p14:creationId xmlns:p14="http://schemas.microsoft.com/office/powerpoint/2010/main" val="1975066405"/>
+      </p:ext>
+    </p:extLst>
+  </p:cSld>
+  <p:clrMapOvr>
+    <a:masterClrMapping/>
+  </p:clrMapOvr>
+</p:sld>
+</file>
+
+<file path=ppt/slides/slide17.xml><?xml version="1.0" encoding="utf-8"?>
+<p:sld xmlns:a="http://schemas.openxmlformats.org/drawingml/2006/main" xmlns:r="http://schemas.openxmlformats.org/officeDocument/2006/relationships" xmlns:p="http://schemas.openxmlformats.org/presentationml/2006/main">
+  <p:cSld>
+    <p:spTree>
+      <p:nvGrpSpPr>
+        <p:cNvPr id="1" name=""/>
+        <p:cNvGrpSpPr/>
+        <p:nvPr/>
+      </p:nvGrpSpPr>
+      <p:grpSpPr>
+        <a:xfrm>
+          <a:off x="0" y="0"/>
+          <a:ext cx="0" cy="0"/>
+          <a:chOff x="0" y="0"/>
+          <a:chExt cx="0" cy="0"/>
+        </a:xfrm>
+      </p:grpSpPr>
+      <p:grpSp>
+        <p:nvGrpSpPr>
+          <p:cNvPr id="2" name="Group 1">
+            <a:extLst>
+              <a:ext uri="{FF2B5EF4-FFF2-40B4-BE49-F238E27FC236}">
+                <a16:creationId xmlns:a16="http://schemas.microsoft.com/office/drawing/2014/main" id="{4498AAC2-84A1-410F-B0B6-2A4FD98A0570}"/>
+              </a:ext>
+            </a:extLst>
+          </p:cNvPr>
+          <p:cNvGrpSpPr/>
+          <p:nvPr/>
+        </p:nvGrpSpPr>
+        <p:grpSpPr>
+          <a:xfrm>
+            <a:off x="381000" y="1999190"/>
+            <a:ext cx="7559974" cy="2974378"/>
+            <a:chOff x="381000" y="1999190"/>
+            <a:chExt cx="7559974" cy="2974378"/>
+          </a:xfrm>
+        </p:grpSpPr>
+        <p:pic>
+          <p:nvPicPr>
+            <p:cNvPr id="13" name="selectMe2"/>
+            <p:cNvPicPr>
+              <a:picLocks noChangeAspect="1"/>
+            </p:cNvPicPr>
+            <p:nvPr/>
+          </p:nvPicPr>
+          <p:blipFill>
+            <a:blip r:embed="rId3">
+              <a:extLst>
+                <a:ext uri="{28A0092B-C50C-407E-A947-70E740481C1C}">
+                  <a14:useLocalDpi xmlns:a14="http://schemas.microsoft.com/office/drawing/2010/main" val="0"/>
+                </a:ext>
+              </a:extLst>
+            </a:blip>
+            <a:srcRect l="26687" t="26727" r="27736" b="26727"/>
+            <a:stretch>
+              <a:fillRect/>
+            </a:stretch>
+          </p:blipFill>
+          <p:spPr>
+            <a:xfrm>
+              <a:off x="1389590" y="2018236"/>
+              <a:ext cx="2893784" cy="2955332"/>
+            </a:xfrm>
+            <a:prstGeom prst="rect">
+              <a:avLst/>
+            </a:prstGeom>
+          </p:spPr>
+        </p:pic>
+        <p:pic>
+          <p:nvPicPr>
+            <p:cNvPr id="14" name="selectMe1"/>
+            <p:cNvPicPr>
+              <a:picLocks noChangeAspect="1"/>
+            </p:cNvPicPr>
+            <p:nvPr/>
+          </p:nvPicPr>
+          <p:blipFill>
+            <a:blip r:embed="rId3">
+              <a:extLst>
+                <a:ext uri="{28A0092B-C50C-407E-A947-70E740481C1C}">
+                  <a14:useLocalDpi xmlns:a14="http://schemas.microsoft.com/office/drawing/2010/main" val="0"/>
+                </a:ext>
+              </a:extLst>
+            </a:blip>
+            <a:srcRect l="26687" t="26687" r="27736" b="26687"/>
+            <a:stretch>
+              <a:fillRect/>
+            </a:stretch>
+          </p:blipFill>
+          <p:spPr>
+            <a:xfrm>
+              <a:off x="5047190" y="1999190"/>
+              <a:ext cx="2893784" cy="2960418"/>
+            </a:xfrm>
+            <a:prstGeom prst="rect">
+              <a:avLst/>
+            </a:prstGeom>
+          </p:spPr>
+        </p:pic>
+        <p:sp>
+          <p:nvSpPr>
+            <p:cNvPr id="4" name="Rectangle 3">
+              <a:extLst>
+                <a:ext uri="{FF2B5EF4-FFF2-40B4-BE49-F238E27FC236}">
+                  <a16:creationId xmlns:a16="http://schemas.microsoft.com/office/drawing/2014/main" id="{AAC13E55-CEB0-45AB-90EC-EC5BB05F6DE5}"/>
+                </a:ext>
+              </a:extLst>
+            </p:cNvPr>
+            <p:cNvSpPr/>
+            <p:nvPr/>
+          </p:nvSpPr>
+          <p:spPr>
+            <a:xfrm>
+              <a:off x="381000" y="2590800"/>
+              <a:ext cx="3048000" cy="1676400"/>
+            </a:xfrm>
+            <a:prstGeom prst="rect">
+              <a:avLst/>
+            </a:prstGeom>
+          </p:spPr>
+          <p:style>
+            <a:lnRef idx="2">
+              <a:schemeClr val="accent1">
+                <a:shade val="50000"/>
+              </a:schemeClr>
+            </a:lnRef>
+            <a:fillRef idx="1">
+              <a:schemeClr val="accent1"/>
+            </a:fillRef>
+            <a:effectRef idx="0">
+              <a:schemeClr val="accent1"/>
+            </a:effectRef>
+            <a:fontRef idx="minor">
+              <a:schemeClr val="lt1"/>
+            </a:fontRef>
+          </p:style>
+          <p:txBody>
+            <a:bodyPr rtlCol="0" anchor="ctr"/>
+            <a:lstStyle/>
+            <a:p>
+              <a:pPr algn="ctr"/>
+              <a:endParaRPr lang="en-US"/>
+            </a:p>
+          </p:txBody>
+        </p:sp>
+      </p:grpSp>
+      <p:sp>
+        <p:nvSpPr>
+          <p:cNvPr id="6" name="text 3">
+            <a:extLst>
+              <a:ext uri="{FF2B5EF4-FFF2-40B4-BE49-F238E27FC236}">
+                <a16:creationId xmlns:a16="http://schemas.microsoft.com/office/drawing/2014/main" id="{C2BE46B6-4805-4101-B783-0763B18E4FBE}"/>
+              </a:ext>
+            </a:extLst>
+          </p:cNvPr>
+          <p:cNvSpPr txBox="1"/>
+          <p:nvPr/>
+        </p:nvSpPr>
+        <p:spPr>
+          <a:xfrm>
+            <a:off x="3365631" y="6019800"/>
+            <a:ext cx="2693814" cy="523220"/>
+          </a:xfrm>
+          <a:prstGeom prst="rect">
+            <a:avLst/>
+          </a:prstGeom>
+          <a:noFill/>
+        </p:spPr>
+        <p:txBody>
+          <a:bodyPr wrap="none" rtlCol="0">
+            <a:spAutoFit/>
+          </a:bodyPr>
+          <a:lstStyle/>
+          <a:p>
+            <a:r>
+              <a:rPr lang="en-US" sz="2800" b="1" dirty="0">
+                <a:solidFill>
+                  <a:schemeClr val="accent1"/>
+                </a:solidFill>
+              </a:rPr>
+              <a:t>Expected Output</a:t>
+            </a:r>
+            <a:endParaRPr lang="en-SG" sz="2800" b="1" dirty="0">
+              <a:solidFill>
+                <a:schemeClr val="accent1"/>
+              </a:solidFill>
+            </a:endParaRPr>
+          </a:p>
+        </p:txBody>
+      </p:sp>
+    </p:spTree>
+    <p:extLst>
+      <p:ext uri="{BB962C8B-B14F-4D97-AF65-F5344CB8AC3E}">
+        <p14:creationId xmlns:p14="http://schemas.microsoft.com/office/powerpoint/2010/main" val="2404144961"/>
+      </p:ext>
+    </p:extLst>
+  </p:cSld>
+  <p:clrMapOvr>
+    <a:masterClrMapping/>
+  </p:clrMapOvr>
+</p:sld>
+</file>
+
+<file path=ppt/slides/slide18.xml><?xml version="1.0" encoding="utf-8"?>
 <p:sld xmlns:a="http://schemas.openxmlformats.org/drawingml/2006/main" xmlns:r="http://schemas.openxmlformats.org/officeDocument/2006/relationships" xmlns:p="http://schemas.openxmlformats.org/presentationml/2006/main" show="0">
   <p:cSld name="PPAck201403240026082737">
     <p:spTree>
@@ -10005,14 +10992,6 @@
   <p:clrMapOvr>
     <a:masterClrMapping/>
   </p:clrMapOvr>
-  <mc:AlternateContent xmlns:mc="http://schemas.openxmlformats.org/markup-compatibility/2006" xmlns:p14="http://schemas.microsoft.com/office/powerpoint/2010/main">
-    <mc:Choice Requires="p14">
-      <p:transition spd="slow" p14:dur="2000"/>
-    </mc:Choice>
-    <mc:Fallback xmlns="">
-      <p:transition spd="slow"/>
-    </mc:Fallback>
-  </mc:AlternateContent>
 </p:sld>
 </file>
 

</xml_diff>

<commit_message>
Make Crop Out Padding with grouped child items (#1535)
</commit_message>
<xml_diff>
--- a/doc/test/CropLab/CropOutPadding.pptx
+++ b/doc/test/CropLab/CropOutPadding.pptx
@@ -7,7 +7,7 @@
     <p:sldMasterId id="2147483672" r:id="rId3"/>
   </p:sldMasterIdLst>
   <p:notesMasterIdLst>
-    <p:notesMasterId r:id="rId16"/>
+    <p:notesMasterId r:id="rId22"/>
   </p:notesMasterIdLst>
   <p:sldIdLst>
     <p:sldId id="287" r:id="rId4"/>
@@ -21,7 +21,13 @@
     <p:sldId id="305" r:id="rId12"/>
     <p:sldId id="306" r:id="rId13"/>
     <p:sldId id="313" r:id="rId14"/>
-    <p:sldId id="274" r:id="rId15"/>
+    <p:sldId id="317" r:id="rId15"/>
+    <p:sldId id="315" r:id="rId16"/>
+    <p:sldId id="318" r:id="rId17"/>
+    <p:sldId id="322" r:id="rId18"/>
+    <p:sldId id="320" r:id="rId19"/>
+    <p:sldId id="323" r:id="rId20"/>
+    <p:sldId id="274" r:id="rId21"/>
   </p:sldIdLst>
   <p:sldSz cx="9144000" cy="6858000" type="screen4x3"/>
   <p:notesSz cx="6858000" cy="9144000"/>
@@ -140,6 +146,12 @@
             <p14:sldId id="305"/>
             <p14:sldId id="306"/>
             <p14:sldId id="313"/>
+            <p14:sldId id="317"/>
+            <p14:sldId id="315"/>
+            <p14:sldId id="318"/>
+            <p14:sldId id="322"/>
+            <p14:sldId id="320"/>
+            <p14:sldId id="323"/>
             <p14:sldId id="274"/>
           </p14:sldIdLst>
         </p14:section>
@@ -161,6 +173,10 @@
     </p:ext>
   </p:extLst>
 </p:presentation>
+</file>
+
+<file path=ppt/revisionInfo.xml><?xml version="1.0" encoding="utf-8"?>
+<p1510:revInfo xmlns:a="http://schemas.openxmlformats.org/drawingml/2006/main" xmlns:r="http://schemas.openxmlformats.org/officeDocument/2006/relationships" xmlns:p1510="http://schemas.microsoft.com/office/powerpoint/2015/10/main"/>
 </file>
 
 <file path=ppt/notesMasters/notesMaster1.xml><?xml version="1.0" encoding="utf-8"?>
@@ -245,7 +261,7 @@
           <a:p>
             <a:fld id="{26004F41-C1A1-4B0D-9EEE-5E3F0E5BC108}" type="datetimeFigureOut">
               <a:rPr lang="en-SG" smtClean="0"/>
-              <a:t>11/5/2017</a:t>
+              <a:t>25/7/2017</a:t>
             </a:fld>
             <a:endParaRPr lang="en-SG"/>
           </a:p>
@@ -681,6 +697,174 @@
 </p:notes>
 </file>
 
+<file path=ppt/notesSlides/notesSlide3.xml><?xml version="1.0" encoding="utf-8"?>
+<p:notes xmlns:a="http://schemas.openxmlformats.org/drawingml/2006/main" xmlns:r="http://schemas.openxmlformats.org/officeDocument/2006/relationships" xmlns:p="http://schemas.openxmlformats.org/presentationml/2006/main">
+  <p:cSld>
+    <p:spTree>
+      <p:nvGrpSpPr>
+        <p:cNvPr id="1" name=""/>
+        <p:cNvGrpSpPr/>
+        <p:nvPr/>
+      </p:nvGrpSpPr>
+      <p:grpSpPr>
+        <a:xfrm>
+          <a:off x="0" y="0"/>
+          <a:ext cx="0" cy="0"/>
+          <a:chOff x="0" y="0"/>
+          <a:chExt cx="0" cy="0"/>
+        </a:xfrm>
+      </p:grpSpPr>
+      <p:sp>
+        <p:nvSpPr>
+          <p:cNvPr id="2" name="Slide Image Placeholder 1"/>
+          <p:cNvSpPr>
+            <a:spLocks noGrp="1" noRot="1" noChangeAspect="1"/>
+          </p:cNvSpPr>
+          <p:nvPr>
+            <p:ph type="sldImg"/>
+          </p:nvPr>
+        </p:nvSpPr>
+        <p:spPr/>
+      </p:sp>
+      <p:sp>
+        <p:nvSpPr>
+          <p:cNvPr id="3" name="Notes Placeholder 2"/>
+          <p:cNvSpPr>
+            <a:spLocks noGrp="1"/>
+          </p:cNvSpPr>
+          <p:nvPr>
+            <p:ph type="body" idx="1"/>
+          </p:nvPr>
+        </p:nvSpPr>
+        <p:spPr/>
+        <p:txBody>
+          <a:bodyPr/>
+          <a:lstStyle/>
+          <a:p>
+            <a:endParaRPr lang="en-SG" dirty="0"/>
+          </a:p>
+        </p:txBody>
+      </p:sp>
+      <p:sp>
+        <p:nvSpPr>
+          <p:cNvPr id="4" name="Slide Number Placeholder 3"/>
+          <p:cNvSpPr>
+            <a:spLocks noGrp="1"/>
+          </p:cNvSpPr>
+          <p:nvPr>
+            <p:ph type="sldNum" sz="quarter" idx="10"/>
+          </p:nvPr>
+        </p:nvSpPr>
+        <p:spPr/>
+        <p:txBody>
+          <a:bodyPr/>
+          <a:lstStyle/>
+          <a:p>
+            <a:fld id="{0015B511-83B7-463E-ACD1-0C1C081EBBC4}" type="slidenum">
+              <a:rPr lang="en-SG" smtClean="0"/>
+              <a:t>16</a:t>
+            </a:fld>
+            <a:endParaRPr lang="en-SG"/>
+          </a:p>
+        </p:txBody>
+      </p:sp>
+    </p:spTree>
+    <p:extLst>
+      <p:ext uri="{BB962C8B-B14F-4D97-AF65-F5344CB8AC3E}">
+        <p14:creationId xmlns:p14="http://schemas.microsoft.com/office/powerpoint/2010/main" val="1918759091"/>
+      </p:ext>
+    </p:extLst>
+  </p:cSld>
+  <p:clrMapOvr>
+    <a:masterClrMapping/>
+  </p:clrMapOvr>
+</p:notes>
+</file>
+
+<file path=ppt/notesSlides/notesSlide4.xml><?xml version="1.0" encoding="utf-8"?>
+<p:notes xmlns:a="http://schemas.openxmlformats.org/drawingml/2006/main" xmlns:r="http://schemas.openxmlformats.org/officeDocument/2006/relationships" xmlns:p="http://schemas.openxmlformats.org/presentationml/2006/main">
+  <p:cSld>
+    <p:spTree>
+      <p:nvGrpSpPr>
+        <p:cNvPr id="1" name=""/>
+        <p:cNvGrpSpPr/>
+        <p:nvPr/>
+      </p:nvGrpSpPr>
+      <p:grpSpPr>
+        <a:xfrm>
+          <a:off x="0" y="0"/>
+          <a:ext cx="0" cy="0"/>
+          <a:chOff x="0" y="0"/>
+          <a:chExt cx="0" cy="0"/>
+        </a:xfrm>
+      </p:grpSpPr>
+      <p:sp>
+        <p:nvSpPr>
+          <p:cNvPr id="2" name="Slide Image Placeholder 1"/>
+          <p:cNvSpPr>
+            <a:spLocks noGrp="1" noRot="1" noChangeAspect="1"/>
+          </p:cNvSpPr>
+          <p:nvPr>
+            <p:ph type="sldImg"/>
+          </p:nvPr>
+        </p:nvSpPr>
+        <p:spPr/>
+      </p:sp>
+      <p:sp>
+        <p:nvSpPr>
+          <p:cNvPr id="3" name="Notes Placeholder 2"/>
+          <p:cNvSpPr>
+            <a:spLocks noGrp="1"/>
+          </p:cNvSpPr>
+          <p:nvPr>
+            <p:ph type="body" idx="1"/>
+          </p:nvPr>
+        </p:nvSpPr>
+        <p:spPr/>
+        <p:txBody>
+          <a:bodyPr/>
+          <a:lstStyle/>
+          <a:p>
+            <a:endParaRPr lang="en-SG" dirty="0"/>
+          </a:p>
+        </p:txBody>
+      </p:sp>
+      <p:sp>
+        <p:nvSpPr>
+          <p:cNvPr id="4" name="Slide Number Placeholder 3"/>
+          <p:cNvSpPr>
+            <a:spLocks noGrp="1"/>
+          </p:cNvSpPr>
+          <p:nvPr>
+            <p:ph type="sldNum" sz="quarter" idx="10"/>
+          </p:nvPr>
+        </p:nvSpPr>
+        <p:spPr/>
+        <p:txBody>
+          <a:bodyPr/>
+          <a:lstStyle/>
+          <a:p>
+            <a:fld id="{0015B511-83B7-463E-ACD1-0C1C081EBBC4}" type="slidenum">
+              <a:rPr lang="en-SG" smtClean="0"/>
+              <a:t>17</a:t>
+            </a:fld>
+            <a:endParaRPr lang="en-SG"/>
+          </a:p>
+        </p:txBody>
+      </p:sp>
+    </p:spTree>
+    <p:extLst>
+      <p:ext uri="{BB962C8B-B14F-4D97-AF65-F5344CB8AC3E}">
+        <p14:creationId xmlns:p14="http://schemas.microsoft.com/office/powerpoint/2010/main" val="1765173484"/>
+      </p:ext>
+    </p:extLst>
+  </p:cSld>
+  <p:clrMapOvr>
+    <a:masterClrMapping/>
+  </p:clrMapOvr>
+</p:notes>
+</file>
+
 <file path=ppt/slideLayouts/slideLayout1.xml><?xml version="1.0" encoding="utf-8"?>
 <p:sldLayout xmlns:a="http://schemas.openxmlformats.org/drawingml/2006/main" xmlns:r="http://schemas.openxmlformats.org/officeDocument/2006/relationships" xmlns:p="http://schemas.openxmlformats.org/presentationml/2006/main" type="title" preserve="1">
   <p:cSld name="Title Slide">
@@ -860,7 +1044,7 @@
           <a:p>
             <a:fld id="{699DC775-C286-4358-8C92-D7E584E969B3}" type="datetimeFigureOut">
               <a:rPr lang="en-US" smtClean="0"/>
-              <a:t>5/11/2017</a:t>
+              <a:t>7/25/2017</a:t>
             </a:fld>
             <a:endParaRPr lang="en-US"/>
           </a:p>
@@ -1028,7 +1212,7 @@
           <a:p>
             <a:fld id="{699DC775-C286-4358-8C92-D7E584E969B3}" type="datetimeFigureOut">
               <a:rPr lang="en-US" smtClean="0"/>
-              <a:t>5/11/2017</a:t>
+              <a:t>7/25/2017</a:t>
             </a:fld>
             <a:endParaRPr lang="en-US"/>
           </a:p>
@@ -1206,7 +1390,7 @@
           <a:p>
             <a:fld id="{699DC775-C286-4358-8C92-D7E584E969B3}" type="datetimeFigureOut">
               <a:rPr lang="en-US" smtClean="0"/>
-              <a:t>5/11/2017</a:t>
+              <a:t>7/25/2017</a:t>
             </a:fld>
             <a:endParaRPr lang="en-US"/>
           </a:p>
@@ -1446,7 +1630,7 @@
           <a:p>
             <a:fld id="{699DC775-C286-4358-8C92-D7E584E969B3}" type="datetimeFigureOut">
               <a:rPr lang="en-US" smtClean="0"/>
-              <a:t>5/11/2017</a:t>
+              <a:t>7/25/2017</a:t>
             </a:fld>
             <a:endParaRPr lang="en-US"/>
           </a:p>
@@ -1614,7 +1798,7 @@
           <a:p>
             <a:fld id="{699DC775-C286-4358-8C92-D7E584E969B3}" type="datetimeFigureOut">
               <a:rPr lang="en-US" smtClean="0"/>
-              <a:t>5/11/2017</a:t>
+              <a:t>7/25/2017</a:t>
             </a:fld>
             <a:endParaRPr lang="en-US"/>
           </a:p>
@@ -1859,7 +2043,7 @@
           <a:p>
             <a:fld id="{699DC775-C286-4358-8C92-D7E584E969B3}" type="datetimeFigureOut">
               <a:rPr lang="en-US" smtClean="0"/>
-              <a:t>5/11/2017</a:t>
+              <a:t>7/25/2017</a:t>
             </a:fld>
             <a:endParaRPr lang="en-US"/>
           </a:p>
@@ -2144,7 +2328,7 @@
           <a:p>
             <a:fld id="{699DC775-C286-4358-8C92-D7E584E969B3}" type="datetimeFigureOut">
               <a:rPr lang="en-US" smtClean="0"/>
-              <a:t>5/11/2017</a:t>
+              <a:t>7/25/2017</a:t>
             </a:fld>
             <a:endParaRPr lang="en-US"/>
           </a:p>
@@ -2563,7 +2747,7 @@
           <a:p>
             <a:fld id="{699DC775-C286-4358-8C92-D7E584E969B3}" type="datetimeFigureOut">
               <a:rPr lang="en-US" smtClean="0"/>
-              <a:t>5/11/2017</a:t>
+              <a:t>7/25/2017</a:t>
             </a:fld>
             <a:endParaRPr lang="en-US"/>
           </a:p>
@@ -2680,7 +2864,7 @@
           <a:p>
             <a:fld id="{699DC775-C286-4358-8C92-D7E584E969B3}" type="datetimeFigureOut">
               <a:rPr lang="en-US" smtClean="0"/>
-              <a:t>5/11/2017</a:t>
+              <a:t>7/25/2017</a:t>
             </a:fld>
             <a:endParaRPr lang="en-US"/>
           </a:p>
@@ -2775,7 +2959,7 @@
           <a:p>
             <a:fld id="{699DC775-C286-4358-8C92-D7E584E969B3}" type="datetimeFigureOut">
               <a:rPr lang="en-US" smtClean="0"/>
-              <a:t>5/11/2017</a:t>
+              <a:t>7/25/2017</a:t>
             </a:fld>
             <a:endParaRPr lang="en-US"/>
           </a:p>
@@ -3050,7 +3234,7 @@
           <a:p>
             <a:fld id="{699DC775-C286-4358-8C92-D7E584E969B3}" type="datetimeFigureOut">
               <a:rPr lang="en-US" smtClean="0"/>
-              <a:t>5/11/2017</a:t>
+              <a:t>7/25/2017</a:t>
             </a:fld>
             <a:endParaRPr lang="en-US"/>
           </a:p>
@@ -3218,7 +3402,7 @@
           <a:p>
             <a:fld id="{699DC775-C286-4358-8C92-D7E584E969B3}" type="datetimeFigureOut">
               <a:rPr lang="en-US" smtClean="0"/>
-              <a:t>5/11/2017</a:t>
+              <a:t>7/25/2017</a:t>
             </a:fld>
             <a:endParaRPr lang="en-US"/>
           </a:p>
@@ -3470,7 +3654,7 @@
           <a:p>
             <a:fld id="{699DC775-C286-4358-8C92-D7E584E969B3}" type="datetimeFigureOut">
               <a:rPr lang="en-US" smtClean="0"/>
-              <a:t>5/11/2017</a:t>
+              <a:t>7/25/2017</a:t>
             </a:fld>
             <a:endParaRPr lang="en-US"/>
           </a:p>
@@ -3638,7 +3822,7 @@
           <a:p>
             <a:fld id="{699DC775-C286-4358-8C92-D7E584E969B3}" type="datetimeFigureOut">
               <a:rPr lang="en-US" smtClean="0"/>
-              <a:t>5/11/2017</a:t>
+              <a:t>7/25/2017</a:t>
             </a:fld>
             <a:endParaRPr lang="en-US"/>
           </a:p>
@@ -3816,7 +4000,7 @@
           <a:p>
             <a:fld id="{699DC775-C286-4358-8C92-D7E584E969B3}" type="datetimeFigureOut">
               <a:rPr lang="en-US" smtClean="0"/>
-              <a:t>5/11/2017</a:t>
+              <a:t>7/25/2017</a:t>
             </a:fld>
             <a:endParaRPr lang="en-US"/>
           </a:p>
@@ -4064,7 +4248,7 @@
           <a:p>
             <a:fld id="{699DC775-C286-4358-8C92-D7E584E969B3}" type="datetimeFigureOut">
               <a:rPr lang="en-US" smtClean="0"/>
-              <a:t>5/11/2017</a:t>
+              <a:t>7/25/2017</a:t>
             </a:fld>
             <a:endParaRPr lang="en-US"/>
           </a:p>
@@ -4240,7 +4424,7 @@
           <a:p>
             <a:fld id="{699DC775-C286-4358-8C92-D7E584E969B3}" type="datetimeFigureOut">
               <a:rPr lang="en-US" smtClean="0"/>
-              <a:t>5/11/2017</a:t>
+              <a:t>7/25/2017</a:t>
             </a:fld>
             <a:endParaRPr lang="en-US"/>
           </a:p>
@@ -4493,7 +4677,7 @@
           <a:p>
             <a:fld id="{699DC775-C286-4358-8C92-D7E584E969B3}" type="datetimeFigureOut">
               <a:rPr lang="en-US" smtClean="0"/>
-              <a:t>5/11/2017</a:t>
+              <a:t>7/25/2017</a:t>
             </a:fld>
             <a:endParaRPr lang="en-US"/>
           </a:p>
@@ -4786,7 +4970,7 @@
           <a:p>
             <a:fld id="{699DC775-C286-4358-8C92-D7E584E969B3}" type="datetimeFigureOut">
               <a:rPr lang="en-US" smtClean="0"/>
-              <a:t>5/11/2017</a:t>
+              <a:t>7/25/2017</a:t>
             </a:fld>
             <a:endParaRPr lang="en-US"/>
           </a:p>
@@ -5213,7 +5397,7 @@
           <a:p>
             <a:fld id="{699DC775-C286-4358-8C92-D7E584E969B3}" type="datetimeFigureOut">
               <a:rPr lang="en-US" smtClean="0"/>
-              <a:t>5/11/2017</a:t>
+              <a:t>7/25/2017</a:t>
             </a:fld>
             <a:endParaRPr lang="en-US"/>
           </a:p>
@@ -5338,7 +5522,7 @@
           <a:p>
             <a:fld id="{699DC775-C286-4358-8C92-D7E584E969B3}" type="datetimeFigureOut">
               <a:rPr lang="en-US" smtClean="0"/>
-              <a:t>5/11/2017</a:t>
+              <a:t>7/25/2017</a:t>
             </a:fld>
             <a:endParaRPr lang="en-US"/>
           </a:p>
@@ -5441,7 +5625,7 @@
           <a:p>
             <a:fld id="{699DC775-C286-4358-8C92-D7E584E969B3}" type="datetimeFigureOut">
               <a:rPr lang="en-US" smtClean="0"/>
-              <a:t>5/11/2017</a:t>
+              <a:t>7/25/2017</a:t>
             </a:fld>
             <a:endParaRPr lang="en-US"/>
           </a:p>
@@ -5686,7 +5870,7 @@
           <a:p>
             <a:fld id="{699DC775-C286-4358-8C92-D7E584E969B3}" type="datetimeFigureOut">
               <a:rPr lang="en-US" smtClean="0"/>
-              <a:t>5/11/2017</a:t>
+              <a:t>7/25/2017</a:t>
             </a:fld>
             <a:endParaRPr lang="en-US"/>
           </a:p>
@@ -5969,7 +6153,7 @@
           <a:p>
             <a:fld id="{699DC775-C286-4358-8C92-D7E584E969B3}" type="datetimeFigureOut">
               <a:rPr lang="en-US" smtClean="0"/>
-              <a:t>5/11/2017</a:t>
+              <a:t>7/25/2017</a:t>
             </a:fld>
             <a:endParaRPr lang="en-US"/>
           </a:p>
@@ -6229,7 +6413,7 @@
           <a:p>
             <a:fld id="{699DC775-C286-4358-8C92-D7E584E969B3}" type="datetimeFigureOut">
               <a:rPr lang="en-US" smtClean="0"/>
-              <a:t>5/11/2017</a:t>
+              <a:t>7/25/2017</a:t>
             </a:fld>
             <a:endParaRPr lang="en-US"/>
           </a:p>
@@ -6405,7 +6589,7 @@
           <a:p>
             <a:fld id="{699DC775-C286-4358-8C92-D7E584E969B3}" type="datetimeFigureOut">
               <a:rPr lang="en-US" smtClean="0"/>
-              <a:t>5/11/2017</a:t>
+              <a:t>7/25/2017</a:t>
             </a:fld>
             <a:endParaRPr lang="en-US"/>
           </a:p>
@@ -6591,7 +6775,7 @@
           <a:p>
             <a:fld id="{699DC775-C286-4358-8C92-D7E584E969B3}" type="datetimeFigureOut">
               <a:rPr lang="en-US" smtClean="0"/>
-              <a:t>5/11/2017</a:t>
+              <a:t>7/25/2017</a:t>
             </a:fld>
             <a:endParaRPr lang="en-US"/>
           </a:p>
@@ -6876,7 +7060,7 @@
           <a:p>
             <a:fld id="{699DC775-C286-4358-8C92-D7E584E969B3}" type="datetimeFigureOut">
               <a:rPr lang="en-US" smtClean="0"/>
-              <a:t>5/11/2017</a:t>
+              <a:t>7/25/2017</a:t>
             </a:fld>
             <a:endParaRPr lang="en-US"/>
           </a:p>
@@ -7295,7 +7479,7 @@
           <a:p>
             <a:fld id="{699DC775-C286-4358-8C92-D7E584E969B3}" type="datetimeFigureOut">
               <a:rPr lang="en-US" smtClean="0"/>
-              <a:t>5/11/2017</a:t>
+              <a:t>7/25/2017</a:t>
             </a:fld>
             <a:endParaRPr lang="en-US"/>
           </a:p>
@@ -7412,7 +7596,7 @@
           <a:p>
             <a:fld id="{699DC775-C286-4358-8C92-D7E584E969B3}" type="datetimeFigureOut">
               <a:rPr lang="en-US" smtClean="0"/>
-              <a:t>5/11/2017</a:t>
+              <a:t>7/25/2017</a:t>
             </a:fld>
             <a:endParaRPr lang="en-US"/>
           </a:p>
@@ -7507,7 +7691,7 @@
           <a:p>
             <a:fld id="{699DC775-C286-4358-8C92-D7E584E969B3}" type="datetimeFigureOut">
               <a:rPr lang="en-US" smtClean="0"/>
-              <a:t>5/11/2017</a:t>
+              <a:t>7/25/2017</a:t>
             </a:fld>
             <a:endParaRPr lang="en-US"/>
           </a:p>
@@ -7782,7 +7966,7 @@
           <a:p>
             <a:fld id="{699DC775-C286-4358-8C92-D7E584E969B3}" type="datetimeFigureOut">
               <a:rPr lang="en-US" smtClean="0"/>
-              <a:t>5/11/2017</a:t>
+              <a:t>7/25/2017</a:t>
             </a:fld>
             <a:endParaRPr lang="en-US"/>
           </a:p>
@@ -8034,7 +8218,7 @@
           <a:p>
             <a:fld id="{699DC775-C286-4358-8C92-D7E584E969B3}" type="datetimeFigureOut">
               <a:rPr lang="en-US" smtClean="0"/>
-              <a:t>5/11/2017</a:t>
+              <a:t>7/25/2017</a:t>
             </a:fld>
             <a:endParaRPr lang="en-US"/>
           </a:p>
@@ -8245,7 +8429,7 @@
           <a:p>
             <a:fld id="{699DC775-C286-4358-8C92-D7E584E969B3}" type="datetimeFigureOut">
               <a:rPr lang="en-US" smtClean="0"/>
-              <a:t>5/11/2017</a:t>
+              <a:t>7/25/2017</a:t>
             </a:fld>
             <a:endParaRPr lang="en-US"/>
           </a:p>
@@ -8758,7 +8942,7 @@
           <a:p>
             <a:fld id="{699DC775-C286-4358-8C92-D7E584E969B3}" type="datetimeFigureOut">
               <a:rPr lang="en-US" smtClean="0"/>
-              <a:t>5/11/2017</a:t>
+              <a:t>7/25/2017</a:t>
             </a:fld>
             <a:endParaRPr lang="en-US"/>
           </a:p>
@@ -9269,7 +9453,7 @@
           <a:p>
             <a:fld id="{699DC775-C286-4358-8C92-D7E584E969B3}" type="datetimeFigureOut">
               <a:rPr lang="en-US" smtClean="0"/>
-              <a:t>5/11/2017</a:t>
+              <a:t>7/25/2017</a:t>
             </a:fld>
             <a:endParaRPr lang="en-US"/>
           </a:p>
@@ -9931,6 +10115,809 @@
 </file>
 
 <file path=ppt/slides/slide12.xml><?xml version="1.0" encoding="utf-8"?>
+<p:sld xmlns:a="http://schemas.openxmlformats.org/drawingml/2006/main" xmlns:r="http://schemas.openxmlformats.org/officeDocument/2006/relationships" xmlns:p="http://schemas.openxmlformats.org/presentationml/2006/main">
+  <p:cSld>
+    <p:spTree>
+      <p:nvGrpSpPr>
+        <p:cNvPr id="1" name=""/>
+        <p:cNvGrpSpPr/>
+        <p:nvPr/>
+      </p:nvGrpSpPr>
+      <p:grpSpPr>
+        <a:xfrm>
+          <a:off x="0" y="0"/>
+          <a:ext cx="0" cy="0"/>
+          <a:chOff x="0" y="0"/>
+          <a:chExt cx="0" cy="0"/>
+        </a:xfrm>
+      </p:grpSpPr>
+      <p:sp>
+        <p:nvSpPr>
+          <p:cNvPr id="2" name="Title 1"/>
+          <p:cNvSpPr>
+            <a:spLocks noGrp="1"/>
+          </p:cNvSpPr>
+          <p:nvPr>
+            <p:ph type="title"/>
+          </p:nvPr>
+        </p:nvSpPr>
+        <p:spPr/>
+        <p:txBody>
+          <a:bodyPr/>
+          <a:lstStyle/>
+          <a:p>
+            <a:r>
+              <a:rPr lang="en-US" dirty="0"/>
+              <a:t>Crop Out Padding:: one child picture</a:t>
+            </a:r>
+            <a:endParaRPr lang="en-SG" dirty="0"/>
+          </a:p>
+        </p:txBody>
+      </p:sp>
+      <p:sp>
+        <p:nvSpPr>
+          <p:cNvPr id="3" name="Content Placeholder 2"/>
+          <p:cNvSpPr>
+            <a:spLocks noGrp="1"/>
+          </p:cNvSpPr>
+          <p:nvPr>
+            <p:ph idx="1"/>
+          </p:nvPr>
+        </p:nvSpPr>
+        <p:spPr/>
+        <p:txBody>
+          <a:bodyPr/>
+          <a:lstStyle/>
+          <a:p>
+            <a:endParaRPr lang="en-SG" dirty="0"/>
+          </a:p>
+        </p:txBody>
+      </p:sp>
+    </p:spTree>
+    <p:extLst>
+      <p:ext uri="{BB962C8B-B14F-4D97-AF65-F5344CB8AC3E}">
+        <p14:creationId xmlns:p14="http://schemas.microsoft.com/office/powerpoint/2010/main" val="473049858"/>
+      </p:ext>
+    </p:extLst>
+  </p:cSld>
+  <p:clrMapOvr>
+    <a:masterClrMapping/>
+  </p:clrMapOvr>
+</p:sld>
+</file>
+
+<file path=ppt/slides/slide13.xml><?xml version="1.0" encoding="utf-8"?>
+<p:sld xmlns:a="http://schemas.openxmlformats.org/drawingml/2006/main" xmlns:r="http://schemas.openxmlformats.org/officeDocument/2006/relationships" xmlns:p="http://schemas.openxmlformats.org/presentationml/2006/main">
+  <p:cSld>
+    <p:spTree>
+      <p:nvGrpSpPr>
+        <p:cNvPr id="1" name=""/>
+        <p:cNvGrpSpPr/>
+        <p:nvPr/>
+      </p:nvGrpSpPr>
+      <p:grpSpPr>
+        <a:xfrm>
+          <a:off x="0" y="0"/>
+          <a:ext cx="0" cy="0"/>
+          <a:chOff x="0" y="0"/>
+          <a:chExt cx="0" cy="0"/>
+        </a:xfrm>
+      </p:grpSpPr>
+      <p:grpSp>
+        <p:nvGrpSpPr>
+          <p:cNvPr id="3" name="Group 2">
+            <a:extLst>
+              <a:ext uri="{FF2B5EF4-FFF2-40B4-BE49-F238E27FC236}">
+                <a16:creationId xmlns:a16="http://schemas.microsoft.com/office/drawing/2014/main" id="{211E2D37-7C31-454B-8116-6DAC0F76564F}"/>
+              </a:ext>
+            </a:extLst>
+          </p:cNvPr>
+          <p:cNvGrpSpPr/>
+          <p:nvPr/>
+        </p:nvGrpSpPr>
+        <p:grpSpPr>
+          <a:xfrm>
+            <a:off x="381000" y="254397"/>
+            <a:ext cx="7365603" cy="6349206"/>
+            <a:chOff x="381000" y="254397"/>
+            <a:chExt cx="7365603" cy="6349206"/>
+          </a:xfrm>
+        </p:grpSpPr>
+        <p:pic>
+          <p:nvPicPr>
+            <p:cNvPr id="5" name="selectMe"/>
+            <p:cNvPicPr>
+              <a:picLocks noChangeAspect="1"/>
+            </p:cNvPicPr>
+            <p:nvPr/>
+          </p:nvPicPr>
+          <p:blipFill>
+            <a:blip r:embed="rId2">
+              <a:extLst>
+                <a:ext uri="{28A0092B-C50C-407E-A947-70E740481C1C}">
+                  <a14:useLocalDpi xmlns:a14="http://schemas.microsoft.com/office/drawing/2010/main" val="0"/>
+                </a:ext>
+              </a:extLst>
+            </a:blip>
+            <a:stretch>
+              <a:fillRect/>
+            </a:stretch>
+          </p:blipFill>
+          <p:spPr>
+            <a:xfrm>
+              <a:off x="1397397" y="254397"/>
+              <a:ext cx="6349206" cy="6349206"/>
+            </a:xfrm>
+            <a:prstGeom prst="rect">
+              <a:avLst/>
+            </a:prstGeom>
+          </p:spPr>
+        </p:pic>
+        <p:sp>
+          <p:nvSpPr>
+            <p:cNvPr id="2" name="Rectangle 1">
+              <a:extLst>
+                <a:ext uri="{FF2B5EF4-FFF2-40B4-BE49-F238E27FC236}">
+                  <a16:creationId xmlns:a16="http://schemas.microsoft.com/office/drawing/2014/main" id="{8E1B5EBF-E7E6-4AFA-85D0-1E02081FD3C6}"/>
+                </a:ext>
+              </a:extLst>
+            </p:cNvPr>
+            <p:cNvSpPr/>
+            <p:nvPr/>
+          </p:nvSpPr>
+          <p:spPr>
+            <a:xfrm>
+              <a:off x="381000" y="2590800"/>
+              <a:ext cx="3048000" cy="1676400"/>
+            </a:xfrm>
+            <a:prstGeom prst="rect">
+              <a:avLst/>
+            </a:prstGeom>
+          </p:spPr>
+          <p:style>
+            <a:lnRef idx="2">
+              <a:schemeClr val="accent1">
+                <a:shade val="50000"/>
+              </a:schemeClr>
+            </a:lnRef>
+            <a:fillRef idx="1">
+              <a:schemeClr val="accent1"/>
+            </a:fillRef>
+            <a:effectRef idx="0">
+              <a:schemeClr val="accent1"/>
+            </a:effectRef>
+            <a:fontRef idx="minor">
+              <a:schemeClr val="lt1"/>
+            </a:fontRef>
+          </p:style>
+          <p:txBody>
+            <a:bodyPr rtlCol="0" anchor="ctr"/>
+            <a:lstStyle/>
+            <a:p>
+              <a:pPr algn="ctr"/>
+              <a:endParaRPr lang="en-US"/>
+            </a:p>
+          </p:txBody>
+        </p:sp>
+      </p:grpSp>
+    </p:spTree>
+    <p:extLst>
+      <p:ext uri="{BB962C8B-B14F-4D97-AF65-F5344CB8AC3E}">
+        <p14:creationId xmlns:p14="http://schemas.microsoft.com/office/powerpoint/2010/main" val="1977358948"/>
+      </p:ext>
+    </p:extLst>
+  </p:cSld>
+  <p:clrMapOvr>
+    <a:masterClrMapping/>
+  </p:clrMapOvr>
+</p:sld>
+</file>
+
+<file path=ppt/slides/slide14.xml><?xml version="1.0" encoding="utf-8"?>
+<p:sld xmlns:a="http://schemas.openxmlformats.org/drawingml/2006/main" xmlns:r="http://schemas.openxmlformats.org/officeDocument/2006/relationships" xmlns:p="http://schemas.openxmlformats.org/presentationml/2006/main">
+  <p:cSld>
+    <p:spTree>
+      <p:nvGrpSpPr>
+        <p:cNvPr id="1" name=""/>
+        <p:cNvGrpSpPr/>
+        <p:nvPr/>
+      </p:nvGrpSpPr>
+      <p:grpSpPr>
+        <a:xfrm>
+          <a:off x="0" y="0"/>
+          <a:ext cx="0" cy="0"/>
+          <a:chOff x="0" y="0"/>
+          <a:chExt cx="0" cy="0"/>
+        </a:xfrm>
+      </p:grpSpPr>
+      <p:grpSp>
+        <p:nvGrpSpPr>
+          <p:cNvPr id="3" name="Group 2">
+            <a:extLst>
+              <a:ext uri="{FF2B5EF4-FFF2-40B4-BE49-F238E27FC236}">
+                <a16:creationId xmlns:a16="http://schemas.microsoft.com/office/drawing/2014/main" id="{211E2D37-7C31-454B-8116-6DAC0F76564F}"/>
+              </a:ext>
+            </a:extLst>
+          </p:cNvPr>
+          <p:cNvGrpSpPr/>
+          <p:nvPr/>
+        </p:nvGrpSpPr>
+        <p:grpSpPr>
+          <a:xfrm>
+            <a:off x="381000" y="1951331"/>
+            <a:ext cx="5611462" cy="2955332"/>
+            <a:chOff x="381000" y="1951331"/>
+            <a:chExt cx="5611462" cy="2955332"/>
+          </a:xfrm>
+        </p:grpSpPr>
+        <p:pic>
+          <p:nvPicPr>
+            <p:cNvPr id="5" name="selectMe"/>
+            <p:cNvPicPr>
+              <a:picLocks noChangeAspect="1"/>
+            </p:cNvPicPr>
+            <p:nvPr/>
+          </p:nvPicPr>
+          <p:blipFill>
+            <a:blip r:embed="rId2">
+              <a:extLst>
+                <a:ext uri="{28A0092B-C50C-407E-A947-70E740481C1C}">
+                  <a14:useLocalDpi xmlns:a14="http://schemas.microsoft.com/office/drawing/2010/main" val="0"/>
+                </a:ext>
+              </a:extLst>
+            </a:blip>
+            <a:srcRect l="26727" t="26727" r="27628" b="26727"/>
+            <a:stretch>
+              <a:fillRect/>
+            </a:stretch>
+          </p:blipFill>
+          <p:spPr>
+            <a:xfrm>
+              <a:off x="3094331" y="1951331"/>
+              <a:ext cx="2898131" cy="2955332"/>
+            </a:xfrm>
+            <a:prstGeom prst="rect">
+              <a:avLst/>
+            </a:prstGeom>
+          </p:spPr>
+        </p:pic>
+        <p:sp>
+          <p:nvSpPr>
+            <p:cNvPr id="2" name="Rectangle 1">
+              <a:extLst>
+                <a:ext uri="{FF2B5EF4-FFF2-40B4-BE49-F238E27FC236}">
+                  <a16:creationId xmlns:a16="http://schemas.microsoft.com/office/drawing/2014/main" id="{8E1B5EBF-E7E6-4AFA-85D0-1E02081FD3C6}"/>
+                </a:ext>
+              </a:extLst>
+            </p:cNvPr>
+            <p:cNvSpPr/>
+            <p:nvPr/>
+          </p:nvSpPr>
+          <p:spPr>
+            <a:xfrm>
+              <a:off x="381000" y="2590800"/>
+              <a:ext cx="3048000" cy="1676400"/>
+            </a:xfrm>
+            <a:prstGeom prst="rect">
+              <a:avLst/>
+            </a:prstGeom>
+          </p:spPr>
+          <p:style>
+            <a:lnRef idx="2">
+              <a:schemeClr val="accent1">
+                <a:shade val="50000"/>
+              </a:schemeClr>
+            </a:lnRef>
+            <a:fillRef idx="1">
+              <a:schemeClr val="accent1"/>
+            </a:fillRef>
+            <a:effectRef idx="0">
+              <a:schemeClr val="accent1"/>
+            </a:effectRef>
+            <a:fontRef idx="minor">
+              <a:schemeClr val="lt1"/>
+            </a:fontRef>
+          </p:style>
+          <p:txBody>
+            <a:bodyPr rtlCol="0" anchor="ctr"/>
+            <a:lstStyle/>
+            <a:p>
+              <a:pPr algn="ctr"/>
+              <a:endParaRPr lang="en-US"/>
+            </a:p>
+          </p:txBody>
+        </p:sp>
+      </p:grpSp>
+      <p:sp>
+        <p:nvSpPr>
+          <p:cNvPr id="6" name="text 3">
+            <a:extLst>
+              <a:ext uri="{FF2B5EF4-FFF2-40B4-BE49-F238E27FC236}">
+                <a16:creationId xmlns:a16="http://schemas.microsoft.com/office/drawing/2014/main" id="{D7878B1D-5ACA-488E-B4AA-41FF2D9C8795}"/>
+              </a:ext>
+            </a:extLst>
+          </p:cNvPr>
+          <p:cNvSpPr txBox="1"/>
+          <p:nvPr/>
+        </p:nvSpPr>
+        <p:spPr>
+          <a:xfrm>
+            <a:off x="3365631" y="6019800"/>
+            <a:ext cx="2693814" cy="523220"/>
+          </a:xfrm>
+          <a:prstGeom prst="rect">
+            <a:avLst/>
+          </a:prstGeom>
+          <a:noFill/>
+        </p:spPr>
+        <p:txBody>
+          <a:bodyPr wrap="none" rtlCol="0">
+            <a:spAutoFit/>
+          </a:bodyPr>
+          <a:lstStyle/>
+          <a:p>
+            <a:r>
+              <a:rPr lang="en-US" sz="2800" b="1" dirty="0">
+                <a:solidFill>
+                  <a:schemeClr val="accent1"/>
+                </a:solidFill>
+              </a:rPr>
+              <a:t>Expected Output</a:t>
+            </a:r>
+            <a:endParaRPr lang="en-SG" sz="2800" b="1" dirty="0">
+              <a:solidFill>
+                <a:schemeClr val="accent1"/>
+              </a:solidFill>
+            </a:endParaRPr>
+          </a:p>
+        </p:txBody>
+      </p:sp>
+    </p:spTree>
+    <p:extLst>
+      <p:ext uri="{BB962C8B-B14F-4D97-AF65-F5344CB8AC3E}">
+        <p14:creationId xmlns:p14="http://schemas.microsoft.com/office/powerpoint/2010/main" val="728863948"/>
+      </p:ext>
+    </p:extLst>
+  </p:cSld>
+  <p:clrMapOvr>
+    <a:masterClrMapping/>
+  </p:clrMapOvr>
+</p:sld>
+</file>
+
+<file path=ppt/slides/slide15.xml><?xml version="1.0" encoding="utf-8"?>
+<p:sld xmlns:a="http://schemas.openxmlformats.org/drawingml/2006/main" xmlns:r="http://schemas.openxmlformats.org/officeDocument/2006/relationships" xmlns:p="http://schemas.openxmlformats.org/presentationml/2006/main">
+  <p:cSld>
+    <p:spTree>
+      <p:nvGrpSpPr>
+        <p:cNvPr id="1" name=""/>
+        <p:cNvGrpSpPr/>
+        <p:nvPr/>
+      </p:nvGrpSpPr>
+      <p:grpSpPr>
+        <a:xfrm>
+          <a:off x="0" y="0"/>
+          <a:ext cx="0" cy="0"/>
+          <a:chOff x="0" y="0"/>
+          <a:chExt cx="0" cy="0"/>
+        </a:xfrm>
+      </p:grpSpPr>
+      <p:sp>
+        <p:nvSpPr>
+          <p:cNvPr id="2" name="Title 1"/>
+          <p:cNvSpPr>
+            <a:spLocks noGrp="1"/>
+          </p:cNvSpPr>
+          <p:nvPr>
+            <p:ph type="title"/>
+          </p:nvPr>
+        </p:nvSpPr>
+        <p:spPr/>
+        <p:txBody>
+          <a:bodyPr/>
+          <a:lstStyle/>
+          <a:p>
+            <a:r>
+              <a:rPr lang="en-US" dirty="0"/>
+              <a:t>Crop Out Padding:: multiple child pictures</a:t>
+            </a:r>
+            <a:endParaRPr lang="en-SG" dirty="0"/>
+          </a:p>
+        </p:txBody>
+      </p:sp>
+      <p:sp>
+        <p:nvSpPr>
+          <p:cNvPr id="3" name="Content Placeholder 2"/>
+          <p:cNvSpPr>
+            <a:spLocks noGrp="1"/>
+          </p:cNvSpPr>
+          <p:nvPr>
+            <p:ph idx="1"/>
+          </p:nvPr>
+        </p:nvSpPr>
+        <p:spPr/>
+        <p:txBody>
+          <a:bodyPr/>
+          <a:lstStyle/>
+          <a:p>
+            <a:endParaRPr lang="en-SG" dirty="0"/>
+          </a:p>
+        </p:txBody>
+      </p:sp>
+    </p:spTree>
+    <p:extLst>
+      <p:ext uri="{BB962C8B-B14F-4D97-AF65-F5344CB8AC3E}">
+        <p14:creationId xmlns:p14="http://schemas.microsoft.com/office/powerpoint/2010/main" val="1911882694"/>
+      </p:ext>
+    </p:extLst>
+  </p:cSld>
+  <p:clrMapOvr>
+    <a:masterClrMapping/>
+  </p:clrMapOvr>
+</p:sld>
+</file>
+
+<file path=ppt/slides/slide16.xml><?xml version="1.0" encoding="utf-8"?>
+<p:sld xmlns:a="http://schemas.openxmlformats.org/drawingml/2006/main" xmlns:r="http://schemas.openxmlformats.org/officeDocument/2006/relationships" xmlns:p="http://schemas.openxmlformats.org/presentationml/2006/main">
+  <p:cSld>
+    <p:spTree>
+      <p:nvGrpSpPr>
+        <p:cNvPr id="1" name=""/>
+        <p:cNvGrpSpPr/>
+        <p:nvPr/>
+      </p:nvGrpSpPr>
+      <p:grpSpPr>
+        <a:xfrm>
+          <a:off x="0" y="0"/>
+          <a:ext cx="0" cy="0"/>
+          <a:chOff x="0" y="0"/>
+          <a:chExt cx="0" cy="0"/>
+        </a:xfrm>
+      </p:grpSpPr>
+      <p:grpSp>
+        <p:nvGrpSpPr>
+          <p:cNvPr id="2" name="Group 1">
+            <a:extLst>
+              <a:ext uri="{FF2B5EF4-FFF2-40B4-BE49-F238E27FC236}">
+                <a16:creationId xmlns:a16="http://schemas.microsoft.com/office/drawing/2014/main" id="{4498AAC2-84A1-410F-B0B6-2A4FD98A0570}"/>
+              </a:ext>
+            </a:extLst>
+          </p:cNvPr>
+          <p:cNvGrpSpPr/>
+          <p:nvPr/>
+        </p:nvGrpSpPr>
+        <p:grpSpPr>
+          <a:xfrm>
+            <a:off x="-304800" y="304800"/>
+            <a:ext cx="10006806" cy="6365708"/>
+            <a:chOff x="-304800" y="304800"/>
+            <a:chExt cx="10006806" cy="6365708"/>
+          </a:xfrm>
+        </p:grpSpPr>
+        <p:pic>
+          <p:nvPicPr>
+            <p:cNvPr id="13" name="selectMe2"/>
+            <p:cNvPicPr>
+              <a:picLocks noChangeAspect="1"/>
+            </p:cNvPicPr>
+            <p:nvPr/>
+          </p:nvPicPr>
+          <p:blipFill>
+            <a:blip r:embed="rId3">
+              <a:extLst>
+                <a:ext uri="{28A0092B-C50C-407E-A947-70E740481C1C}">
+                  <a14:useLocalDpi xmlns:a14="http://schemas.microsoft.com/office/drawing/2010/main" val="0"/>
+                </a:ext>
+              </a:extLst>
+            </a:blip>
+            <a:stretch>
+              <a:fillRect/>
+            </a:stretch>
+          </p:blipFill>
+          <p:spPr>
+            <a:xfrm>
+              <a:off x="-304800" y="321302"/>
+              <a:ext cx="6349206" cy="6349206"/>
+            </a:xfrm>
+            <a:prstGeom prst="rect">
+              <a:avLst/>
+            </a:prstGeom>
+          </p:spPr>
+        </p:pic>
+        <p:pic>
+          <p:nvPicPr>
+            <p:cNvPr id="14" name="selectMe1"/>
+            <p:cNvPicPr>
+              <a:picLocks noChangeAspect="1"/>
+            </p:cNvPicPr>
+            <p:nvPr/>
+          </p:nvPicPr>
+          <p:blipFill>
+            <a:blip r:embed="rId3">
+              <a:extLst>
+                <a:ext uri="{28A0092B-C50C-407E-A947-70E740481C1C}">
+                  <a14:useLocalDpi xmlns:a14="http://schemas.microsoft.com/office/drawing/2010/main" val="0"/>
+                </a:ext>
+              </a:extLst>
+            </a:blip>
+            <a:stretch>
+              <a:fillRect/>
+            </a:stretch>
+          </p:blipFill>
+          <p:spPr>
+            <a:xfrm>
+              <a:off x="3352800" y="304800"/>
+              <a:ext cx="6349206" cy="6349206"/>
+            </a:xfrm>
+            <a:prstGeom prst="rect">
+              <a:avLst/>
+            </a:prstGeom>
+          </p:spPr>
+        </p:pic>
+        <p:sp>
+          <p:nvSpPr>
+            <p:cNvPr id="4" name="Rectangle 3">
+              <a:extLst>
+                <a:ext uri="{FF2B5EF4-FFF2-40B4-BE49-F238E27FC236}">
+                  <a16:creationId xmlns:a16="http://schemas.microsoft.com/office/drawing/2014/main" id="{AAC13E55-CEB0-45AB-90EC-EC5BB05F6DE5}"/>
+                </a:ext>
+              </a:extLst>
+            </p:cNvPr>
+            <p:cNvSpPr/>
+            <p:nvPr/>
+          </p:nvSpPr>
+          <p:spPr>
+            <a:xfrm>
+              <a:off x="381000" y="2590800"/>
+              <a:ext cx="3048000" cy="1676400"/>
+            </a:xfrm>
+            <a:prstGeom prst="rect">
+              <a:avLst/>
+            </a:prstGeom>
+          </p:spPr>
+          <p:style>
+            <a:lnRef idx="2">
+              <a:schemeClr val="accent1">
+                <a:shade val="50000"/>
+              </a:schemeClr>
+            </a:lnRef>
+            <a:fillRef idx="1">
+              <a:schemeClr val="accent1"/>
+            </a:fillRef>
+            <a:effectRef idx="0">
+              <a:schemeClr val="accent1"/>
+            </a:effectRef>
+            <a:fontRef idx="minor">
+              <a:schemeClr val="lt1"/>
+            </a:fontRef>
+          </p:style>
+          <p:txBody>
+            <a:bodyPr rtlCol="0" anchor="ctr"/>
+            <a:lstStyle/>
+            <a:p>
+              <a:pPr algn="ctr"/>
+              <a:endParaRPr lang="en-US"/>
+            </a:p>
+          </p:txBody>
+        </p:sp>
+      </p:grpSp>
+    </p:spTree>
+    <p:extLst>
+      <p:ext uri="{BB962C8B-B14F-4D97-AF65-F5344CB8AC3E}">
+        <p14:creationId xmlns:p14="http://schemas.microsoft.com/office/powerpoint/2010/main" val="1975066405"/>
+      </p:ext>
+    </p:extLst>
+  </p:cSld>
+  <p:clrMapOvr>
+    <a:masterClrMapping/>
+  </p:clrMapOvr>
+</p:sld>
+</file>
+
+<file path=ppt/slides/slide17.xml><?xml version="1.0" encoding="utf-8"?>
+<p:sld xmlns:a="http://schemas.openxmlformats.org/drawingml/2006/main" xmlns:r="http://schemas.openxmlformats.org/officeDocument/2006/relationships" xmlns:p="http://schemas.openxmlformats.org/presentationml/2006/main">
+  <p:cSld>
+    <p:spTree>
+      <p:nvGrpSpPr>
+        <p:cNvPr id="1" name=""/>
+        <p:cNvGrpSpPr/>
+        <p:nvPr/>
+      </p:nvGrpSpPr>
+      <p:grpSpPr>
+        <a:xfrm>
+          <a:off x="0" y="0"/>
+          <a:ext cx="0" cy="0"/>
+          <a:chOff x="0" y="0"/>
+          <a:chExt cx="0" cy="0"/>
+        </a:xfrm>
+      </p:grpSpPr>
+      <p:grpSp>
+        <p:nvGrpSpPr>
+          <p:cNvPr id="2" name="Group 1">
+            <a:extLst>
+              <a:ext uri="{FF2B5EF4-FFF2-40B4-BE49-F238E27FC236}">
+                <a16:creationId xmlns:a16="http://schemas.microsoft.com/office/drawing/2014/main" id="{4498AAC2-84A1-410F-B0B6-2A4FD98A0570}"/>
+              </a:ext>
+            </a:extLst>
+          </p:cNvPr>
+          <p:cNvGrpSpPr/>
+          <p:nvPr/>
+        </p:nvGrpSpPr>
+        <p:grpSpPr>
+          <a:xfrm>
+            <a:off x="381000" y="1999190"/>
+            <a:ext cx="7559974" cy="2974378"/>
+            <a:chOff x="381000" y="1999190"/>
+            <a:chExt cx="7559974" cy="2974378"/>
+          </a:xfrm>
+        </p:grpSpPr>
+        <p:pic>
+          <p:nvPicPr>
+            <p:cNvPr id="13" name="selectMe2"/>
+            <p:cNvPicPr>
+              <a:picLocks noChangeAspect="1"/>
+            </p:cNvPicPr>
+            <p:nvPr/>
+          </p:nvPicPr>
+          <p:blipFill>
+            <a:blip r:embed="rId3">
+              <a:extLst>
+                <a:ext uri="{28A0092B-C50C-407E-A947-70E740481C1C}">
+                  <a14:useLocalDpi xmlns:a14="http://schemas.microsoft.com/office/drawing/2010/main" val="0"/>
+                </a:ext>
+              </a:extLst>
+            </a:blip>
+            <a:srcRect l="26687" t="26727" r="27736" b="26727"/>
+            <a:stretch>
+              <a:fillRect/>
+            </a:stretch>
+          </p:blipFill>
+          <p:spPr>
+            <a:xfrm>
+              <a:off x="1389590" y="2018236"/>
+              <a:ext cx="2893784" cy="2955332"/>
+            </a:xfrm>
+            <a:prstGeom prst="rect">
+              <a:avLst/>
+            </a:prstGeom>
+          </p:spPr>
+        </p:pic>
+        <p:pic>
+          <p:nvPicPr>
+            <p:cNvPr id="14" name="selectMe1"/>
+            <p:cNvPicPr>
+              <a:picLocks noChangeAspect="1"/>
+            </p:cNvPicPr>
+            <p:nvPr/>
+          </p:nvPicPr>
+          <p:blipFill>
+            <a:blip r:embed="rId3">
+              <a:extLst>
+                <a:ext uri="{28A0092B-C50C-407E-A947-70E740481C1C}">
+                  <a14:useLocalDpi xmlns:a14="http://schemas.microsoft.com/office/drawing/2010/main" val="0"/>
+                </a:ext>
+              </a:extLst>
+            </a:blip>
+            <a:srcRect l="26687" t="26687" r="27736" b="26687"/>
+            <a:stretch>
+              <a:fillRect/>
+            </a:stretch>
+          </p:blipFill>
+          <p:spPr>
+            <a:xfrm>
+              <a:off x="5047190" y="1999190"/>
+              <a:ext cx="2893784" cy="2960418"/>
+            </a:xfrm>
+            <a:prstGeom prst="rect">
+              <a:avLst/>
+            </a:prstGeom>
+          </p:spPr>
+        </p:pic>
+        <p:sp>
+          <p:nvSpPr>
+            <p:cNvPr id="4" name="Rectangle 3">
+              <a:extLst>
+                <a:ext uri="{FF2B5EF4-FFF2-40B4-BE49-F238E27FC236}">
+                  <a16:creationId xmlns:a16="http://schemas.microsoft.com/office/drawing/2014/main" id="{AAC13E55-CEB0-45AB-90EC-EC5BB05F6DE5}"/>
+                </a:ext>
+              </a:extLst>
+            </p:cNvPr>
+            <p:cNvSpPr/>
+            <p:nvPr/>
+          </p:nvSpPr>
+          <p:spPr>
+            <a:xfrm>
+              <a:off x="381000" y="2590800"/>
+              <a:ext cx="3048000" cy="1676400"/>
+            </a:xfrm>
+            <a:prstGeom prst="rect">
+              <a:avLst/>
+            </a:prstGeom>
+          </p:spPr>
+          <p:style>
+            <a:lnRef idx="2">
+              <a:schemeClr val="accent1">
+                <a:shade val="50000"/>
+              </a:schemeClr>
+            </a:lnRef>
+            <a:fillRef idx="1">
+              <a:schemeClr val="accent1"/>
+            </a:fillRef>
+            <a:effectRef idx="0">
+              <a:schemeClr val="accent1"/>
+            </a:effectRef>
+            <a:fontRef idx="minor">
+              <a:schemeClr val="lt1"/>
+            </a:fontRef>
+          </p:style>
+          <p:txBody>
+            <a:bodyPr rtlCol="0" anchor="ctr"/>
+            <a:lstStyle/>
+            <a:p>
+              <a:pPr algn="ctr"/>
+              <a:endParaRPr lang="en-US"/>
+            </a:p>
+          </p:txBody>
+        </p:sp>
+      </p:grpSp>
+      <p:sp>
+        <p:nvSpPr>
+          <p:cNvPr id="6" name="text 3">
+            <a:extLst>
+              <a:ext uri="{FF2B5EF4-FFF2-40B4-BE49-F238E27FC236}">
+                <a16:creationId xmlns:a16="http://schemas.microsoft.com/office/drawing/2014/main" id="{C2BE46B6-4805-4101-B783-0763B18E4FBE}"/>
+              </a:ext>
+            </a:extLst>
+          </p:cNvPr>
+          <p:cNvSpPr txBox="1"/>
+          <p:nvPr/>
+        </p:nvSpPr>
+        <p:spPr>
+          <a:xfrm>
+            <a:off x="3365631" y="6019800"/>
+            <a:ext cx="2693814" cy="523220"/>
+          </a:xfrm>
+          <a:prstGeom prst="rect">
+            <a:avLst/>
+          </a:prstGeom>
+          <a:noFill/>
+        </p:spPr>
+        <p:txBody>
+          <a:bodyPr wrap="none" rtlCol="0">
+            <a:spAutoFit/>
+          </a:bodyPr>
+          <a:lstStyle/>
+          <a:p>
+            <a:r>
+              <a:rPr lang="en-US" sz="2800" b="1" dirty="0">
+                <a:solidFill>
+                  <a:schemeClr val="accent1"/>
+                </a:solidFill>
+              </a:rPr>
+              <a:t>Expected Output</a:t>
+            </a:r>
+            <a:endParaRPr lang="en-SG" sz="2800" b="1" dirty="0">
+              <a:solidFill>
+                <a:schemeClr val="accent1"/>
+              </a:solidFill>
+            </a:endParaRPr>
+          </a:p>
+        </p:txBody>
+      </p:sp>
+    </p:spTree>
+    <p:extLst>
+      <p:ext uri="{BB962C8B-B14F-4D97-AF65-F5344CB8AC3E}">
+        <p14:creationId xmlns:p14="http://schemas.microsoft.com/office/powerpoint/2010/main" val="2404144961"/>
+      </p:ext>
+    </p:extLst>
+  </p:cSld>
+  <p:clrMapOvr>
+    <a:masterClrMapping/>
+  </p:clrMapOvr>
+</p:sld>
+</file>
+
+<file path=ppt/slides/slide18.xml><?xml version="1.0" encoding="utf-8"?>
 <p:sld xmlns:a="http://schemas.openxmlformats.org/drawingml/2006/main" xmlns:r="http://schemas.openxmlformats.org/officeDocument/2006/relationships" xmlns:p="http://schemas.openxmlformats.org/presentationml/2006/main" show="0">
   <p:cSld name="PPAck201403240026082737">
     <p:spTree>
@@ -10005,14 +10992,6 @@
   <p:clrMapOvr>
     <a:masterClrMapping/>
   </p:clrMapOvr>
-  <mc:AlternateContent xmlns:mc="http://schemas.openxmlformats.org/markup-compatibility/2006" xmlns:p14="http://schemas.microsoft.com/office/powerpoint/2010/main">
-    <mc:Choice Requires="p14">
-      <p:transition spd="slow" p14:dur="2000"/>
-    </mc:Choice>
-    <mc:Fallback xmlns="">
-      <p:transition spd="slow"/>
-    </mc:Fallback>
-  </mc:AlternateContent>
 </p:sld>
 </file>
 

</xml_diff>